<commit_message>
add changes to pdf
</commit_message>
<xml_diff>
--- a/Sliding Squares in Parallel.pptx
+++ b/Sliding Squares in Parallel.pptx
@@ -11,6 +11,15 @@
     <p:sldId id="259" r:id="rId5"/>
     <p:sldId id="260" r:id="rId6"/>
     <p:sldId id="261" r:id="rId7"/>
+    <p:sldId id="262" r:id="rId8"/>
+    <p:sldId id="263" r:id="rId9"/>
+    <p:sldId id="264" r:id="rId10"/>
+    <p:sldId id="265" r:id="rId11"/>
+    <p:sldId id="266" r:id="rId12"/>
+    <p:sldId id="267" r:id="rId13"/>
+    <p:sldId id="268" r:id="rId14"/>
+    <p:sldId id="269" r:id="rId15"/>
+    <p:sldId id="270" r:id="rId16"/>
   </p:sldIdLst>
   <p:sldSz cx="12192000" cy="6858000"/>
   <p:notesSz cx="6858000" cy="9144000"/>
@@ -109,6 +118,11 @@
       </a:defRPr>
     </a:lvl9pPr>
   </p:defaultTextStyle>
+  <p:extLst>
+    <p:ext uri="{EFAFB233-063F-42B5-8137-9DF3F51BA10A}">
+      <p15:sldGuideLst xmlns:p15="http://schemas.microsoft.com/office/powerpoint/2012/main"/>
+    </p:ext>
+  </p:extLst>
 </p:presentation>
 </file>
 
@@ -197,6 +211,13 @@
               <a:schemeClr val="lt1"/>
             </a:fontRef>
           </p:style>
+          <p:txBody>
+            <a:bodyPr/>
+            <a:lstStyle/>
+            <a:p>
+              <a:endParaRPr lang="hu-HU"/>
+            </a:p>
+          </p:txBody>
         </p:sp>
         <p:sp>
           <p:nvSpPr>
@@ -261,6 +282,13 @@
               <a:noFill/>
             </a:ln>
           </p:spPr>
+          <p:txBody>
+            <a:bodyPr/>
+            <a:lstStyle/>
+            <a:p>
+              <a:endParaRPr lang="hu-HU"/>
+            </a:p>
+          </p:txBody>
         </p:sp>
       </p:grpSp>
       <p:sp>
@@ -522,6 +550,13 @@
             <a:schemeClr val="lt1"/>
           </a:fontRef>
         </p:style>
+        <p:txBody>
+          <a:bodyPr/>
+          <a:lstStyle/>
+          <a:p>
+            <a:endParaRPr lang="hu-HU"/>
+          </a:p>
+        </p:txBody>
       </p:sp>
       <p:sp>
         <p:nvSpPr>
@@ -11890,6 +11925,13 @@
               <a:schemeClr val="lt1"/>
             </a:fontRef>
           </p:style>
+          <p:txBody>
+            <a:bodyPr/>
+            <a:lstStyle/>
+            <a:p>
+              <a:endParaRPr lang="hu-HU"/>
+            </a:p>
+          </p:txBody>
         </p:sp>
         <p:sp>
           <p:nvSpPr>
@@ -11947,6 +11989,13 @@
               <a:schemeClr val="lt1"/>
             </a:fontRef>
           </p:style>
+          <p:txBody>
+            <a:bodyPr/>
+            <a:lstStyle/>
+            <a:p>
+              <a:endParaRPr lang="hu-HU"/>
+            </a:p>
+          </p:txBody>
         </p:sp>
         <p:sp>
           <p:nvSpPr>
@@ -12004,6 +12053,13 @@
               <a:schemeClr val="lt1"/>
             </a:fontRef>
           </p:style>
+          <p:txBody>
+            <a:bodyPr/>
+            <a:lstStyle/>
+            <a:p>
+              <a:endParaRPr lang="hu-HU"/>
+            </a:p>
+          </p:txBody>
         </p:sp>
         <p:sp>
           <p:nvSpPr>
@@ -12061,6 +12117,13 @@
               <a:schemeClr val="lt1"/>
             </a:fontRef>
           </p:style>
+          <p:txBody>
+            <a:bodyPr/>
+            <a:lstStyle/>
+            <a:p>
+              <a:endParaRPr lang="hu-HU"/>
+            </a:p>
+          </p:txBody>
         </p:sp>
         <p:sp>
           <p:nvSpPr>
@@ -12118,6 +12181,13 @@
               <a:schemeClr val="lt1"/>
             </a:fontRef>
           </p:style>
+          <p:txBody>
+            <a:bodyPr/>
+            <a:lstStyle/>
+            <a:p>
+              <a:endParaRPr lang="hu-HU"/>
+            </a:p>
+          </p:txBody>
         </p:sp>
         <p:sp>
           <p:nvSpPr>
@@ -12175,6 +12245,13 @@
               <a:schemeClr val="lt1"/>
             </a:fontRef>
           </p:style>
+          <p:txBody>
+            <a:bodyPr/>
+            <a:lstStyle/>
+            <a:p>
+              <a:endParaRPr lang="hu-HU"/>
+            </a:p>
+          </p:txBody>
         </p:sp>
         <p:sp>
           <p:nvSpPr>
@@ -12322,6 +12399,13 @@
               <a:noFill/>
             </a:ln>
           </p:spPr>
+          <p:txBody>
+            <a:bodyPr/>
+            <a:lstStyle/>
+            <a:p>
+              <a:endParaRPr lang="hu-HU"/>
+            </a:p>
+          </p:txBody>
         </p:sp>
         <p:sp>
           <p:nvSpPr>
@@ -12506,6 +12590,13 @@
               <a:noFill/>
             </a:ln>
           </p:spPr>
+          <p:txBody>
+            <a:bodyPr/>
+            <a:lstStyle/>
+            <a:p>
+              <a:endParaRPr lang="hu-HU"/>
+            </a:p>
+          </p:txBody>
         </p:sp>
         <p:sp>
           <p:nvSpPr>
@@ -12570,6 +12661,13 @@
               <a:noFill/>
             </a:ln>
           </p:spPr>
+          <p:txBody>
+            <a:bodyPr/>
+            <a:lstStyle/>
+            <a:p>
+              <a:endParaRPr lang="hu-HU"/>
+            </a:p>
+          </p:txBody>
         </p:sp>
       </p:grpSp>
       <p:sp>
@@ -12776,6 +12874,13 @@
             <a:schemeClr val="lt1"/>
           </a:fontRef>
         </p:style>
+        <p:txBody>
+          <a:bodyPr/>
+          <a:lstStyle/>
+          <a:p>
+            <a:endParaRPr lang="hu-HU"/>
+          </a:p>
+        </p:txBody>
       </p:sp>
       <p:sp>
         <p:nvSpPr>
@@ -13605,6 +13710,1327 @@
 </p:sld>
 </file>
 
+<file path=ppt/slides/slide10.xml><?xml version="1.0" encoding="utf-8"?>
+<p:sld xmlns:a="http://schemas.openxmlformats.org/drawingml/2006/main" xmlns:r="http://schemas.openxmlformats.org/officeDocument/2006/relationships" xmlns:p="http://schemas.openxmlformats.org/presentationml/2006/main">
+  <p:cSld>
+    <p:spTree>
+      <p:nvGrpSpPr>
+        <p:cNvPr id="1" name=""/>
+        <p:cNvGrpSpPr/>
+        <p:nvPr/>
+      </p:nvGrpSpPr>
+      <p:grpSpPr>
+        <a:xfrm>
+          <a:off x="0" y="0"/>
+          <a:ext cx="0" cy="0"/>
+          <a:chOff x="0" y="0"/>
+          <a:chExt cx="0" cy="0"/>
+        </a:xfrm>
+      </p:grpSpPr>
+      <p:sp>
+        <p:nvSpPr>
+          <p:cNvPr id="2" name="Cím 1">
+            <a:extLst>
+              <a:ext uri="{FF2B5EF4-FFF2-40B4-BE49-F238E27FC236}">
+                <a16:creationId xmlns:a16="http://schemas.microsoft.com/office/drawing/2014/main" id="{24B1C173-828F-75A2-1B88-FBA99107A675}"/>
+              </a:ext>
+            </a:extLst>
+          </p:cNvPr>
+          <p:cNvSpPr>
+            <a:spLocks noGrp="1"/>
+          </p:cNvSpPr>
+          <p:nvPr>
+            <p:ph type="title"/>
+          </p:nvPr>
+        </p:nvSpPr>
+        <p:spPr/>
+        <p:txBody>
+          <a:bodyPr/>
+          <a:lstStyle/>
+          <a:p>
+            <a:r>
+              <a:rPr lang="hu-HU" dirty="0"/>
+              <a:t>A mozgás típusai </a:t>
+            </a:r>
+          </a:p>
+        </p:txBody>
+      </p:sp>
+      <p:sp>
+        <p:nvSpPr>
+          <p:cNvPr id="3" name="Tartalom helye 2">
+            <a:extLst>
+              <a:ext uri="{FF2B5EF4-FFF2-40B4-BE49-F238E27FC236}">
+                <a16:creationId xmlns:a16="http://schemas.microsoft.com/office/drawing/2014/main" id="{83B233A1-D498-F693-9524-F741772AA3F7}"/>
+              </a:ext>
+            </a:extLst>
+          </p:cNvPr>
+          <p:cNvSpPr>
+            <a:spLocks noGrp="1"/>
+          </p:cNvSpPr>
+          <p:nvPr>
+            <p:ph idx="1"/>
+          </p:nvPr>
+        </p:nvSpPr>
+        <p:spPr/>
+        <p:txBody>
+          <a:bodyPr>
+            <a:normAutofit fontScale="92500" lnSpcReduction="10000"/>
+          </a:bodyPr>
+          <a:lstStyle/>
+          <a:p>
+            <a:r>
+              <a:rPr lang="hu-HU" dirty="0"/>
+              <a:t>A modulok </a:t>
+            </a:r>
+            <a:r>
+              <a:rPr lang="hu-HU" b="1" dirty="0"/>
+              <a:t>kétféle mozdulatot</a:t>
+            </a:r>
+            <a:r>
+              <a:rPr lang="hu-HU" dirty="0"/>
+              <a:t> hajthatnak végre, mindig </a:t>
+            </a:r>
+            <a:r>
+              <a:rPr lang="hu-HU" b="1" dirty="0"/>
+              <a:t>rácspontosan</a:t>
+            </a:r>
+            <a:r>
+              <a:rPr lang="hu-HU" dirty="0"/>
+              <a:t> és </a:t>
+            </a:r>
+            <a:r>
+              <a:rPr lang="hu-HU" b="1" dirty="0"/>
+              <a:t>ütközésmentesen</a:t>
+            </a:r>
+            <a:r>
+              <a:rPr lang="hu-HU" dirty="0"/>
+              <a:t>:</a:t>
+            </a:r>
+          </a:p>
+          <a:p>
+            <a:r>
+              <a:rPr lang="hu-HU" b="1" dirty="0" err="1"/>
+              <a:t>Slide</a:t>
+            </a:r>
+            <a:r>
+              <a:rPr lang="hu-HU" b="1" dirty="0"/>
+              <a:t> (csúszás):</a:t>
+            </a:r>
+            <a:endParaRPr lang="hu-HU" dirty="0"/>
+          </a:p>
+          <a:p>
+            <a:pPr lvl="1"/>
+            <a:r>
+              <a:rPr lang="hu-HU" dirty="0"/>
+              <a:t>A modul </a:t>
+            </a:r>
+            <a:r>
+              <a:rPr lang="hu-HU" b="1" dirty="0"/>
+              <a:t>egy élszomszédos cellába</a:t>
+            </a:r>
+            <a:r>
+              <a:rPr lang="hu-HU" dirty="0"/>
+              <a:t> csúszik,</a:t>
+            </a:r>
+          </a:p>
+          <a:p>
+            <a:pPr lvl="1"/>
+            <a:r>
+              <a:rPr lang="hu-HU" dirty="0"/>
+              <a:t>csak akkor, ha </a:t>
+            </a:r>
+            <a:r>
+              <a:rPr lang="hu-HU" b="1" dirty="0"/>
+              <a:t>az út mentén végig foglalt cellák</a:t>
+            </a:r>
+            <a:r>
+              <a:rPr lang="hu-HU" dirty="0"/>
+              <a:t> vannak (vagyis a modul egy „fal mentén” csúszik).</a:t>
+            </a:r>
+          </a:p>
+          <a:p>
+            <a:r>
+              <a:rPr lang="hu-HU" b="1" dirty="0" err="1"/>
+              <a:t>Convex</a:t>
+            </a:r>
+            <a:r>
+              <a:rPr lang="hu-HU" b="1" dirty="0"/>
+              <a:t> </a:t>
+            </a:r>
+            <a:r>
+              <a:rPr lang="hu-HU" b="1" dirty="0" err="1"/>
+              <a:t>transition</a:t>
+            </a:r>
+            <a:r>
+              <a:rPr lang="hu-HU" b="1" dirty="0"/>
+              <a:t> (konvex átmenet):</a:t>
+            </a:r>
+            <a:endParaRPr lang="hu-HU" dirty="0"/>
+          </a:p>
+          <a:p>
+            <a:pPr lvl="1"/>
+            <a:r>
+              <a:rPr lang="hu-HU" dirty="0"/>
+              <a:t>A modul </a:t>
+            </a:r>
+            <a:r>
+              <a:rPr lang="hu-HU" b="1" dirty="0"/>
+              <a:t>átlép egy sarok mentén</a:t>
+            </a:r>
+            <a:r>
+              <a:rPr lang="hu-HU" dirty="0"/>
+              <a:t> egy szomszédos cellába,</a:t>
+            </a:r>
+          </a:p>
+          <a:p>
+            <a:pPr lvl="1"/>
+            <a:r>
+              <a:rPr lang="hu-HU" dirty="0"/>
+              <a:t>csak akkor lehetséges, ha </a:t>
+            </a:r>
+            <a:r>
+              <a:rPr lang="hu-HU" b="1" dirty="0"/>
+              <a:t>a célcella és az átmeneti cella üres</a:t>
+            </a:r>
+            <a:r>
+              <a:rPr lang="hu-HU" dirty="0"/>
+              <a:t>.</a:t>
+            </a:r>
+          </a:p>
+          <a:p>
+            <a:r>
+              <a:rPr lang="hu-HU" dirty="0"/>
+              <a:t>Példa: Egy modul elmozdulhat keletre, ha mellette lévő cellák folyamatosan foglaltak, vagy „átugorhat” egy üres sarok mentén.</a:t>
+            </a:r>
+          </a:p>
+          <a:p>
+            <a:endParaRPr lang="hu-HU" dirty="0"/>
+          </a:p>
+        </p:txBody>
+      </p:sp>
+    </p:spTree>
+    <p:extLst>
+      <p:ext uri="{BB962C8B-B14F-4D97-AF65-F5344CB8AC3E}">
+        <p14:creationId xmlns:p14="http://schemas.microsoft.com/office/powerpoint/2010/main" val="654083044"/>
+      </p:ext>
+    </p:extLst>
+  </p:cSld>
+  <p:clrMapOvr>
+    <a:masterClrMapping/>
+  </p:clrMapOvr>
+</p:sld>
+</file>
+
+<file path=ppt/slides/slide11.xml><?xml version="1.0" encoding="utf-8"?>
+<p:sld xmlns:a="http://schemas.openxmlformats.org/drawingml/2006/main" xmlns:r="http://schemas.openxmlformats.org/officeDocument/2006/relationships" xmlns:p="http://schemas.openxmlformats.org/presentationml/2006/main">
+  <p:cSld>
+    <p:spTree>
+      <p:nvGrpSpPr>
+        <p:cNvPr id="1" name=""/>
+        <p:cNvGrpSpPr/>
+        <p:nvPr/>
+      </p:nvGrpSpPr>
+      <p:grpSpPr>
+        <a:xfrm>
+          <a:off x="0" y="0"/>
+          <a:ext cx="0" cy="0"/>
+          <a:chOff x="0" y="0"/>
+          <a:chExt cx="0" cy="0"/>
+        </a:xfrm>
+      </p:grpSpPr>
+      <p:sp>
+        <p:nvSpPr>
+          <p:cNvPr id="2" name="Cím 1">
+            <a:extLst>
+              <a:ext uri="{FF2B5EF4-FFF2-40B4-BE49-F238E27FC236}">
+                <a16:creationId xmlns:a16="http://schemas.microsoft.com/office/drawing/2014/main" id="{B5AF0C0E-A07A-BDBC-442A-DD5E33D43D61}"/>
+              </a:ext>
+            </a:extLst>
+          </p:cNvPr>
+          <p:cNvSpPr>
+            <a:spLocks noGrp="1"/>
+          </p:cNvSpPr>
+          <p:nvPr>
+            <p:ph type="title"/>
+          </p:nvPr>
+        </p:nvSpPr>
+        <p:spPr/>
+        <p:txBody>
+          <a:bodyPr/>
+          <a:lstStyle/>
+          <a:p>
+            <a:r>
+              <a:rPr lang="hu-HU" dirty="0"/>
+              <a:t>Párhuzamos mozgás – „</a:t>
+            </a:r>
+            <a:r>
+              <a:rPr lang="hu-HU" dirty="0" err="1"/>
+              <a:t>transformation</a:t>
+            </a:r>
+            <a:r>
+              <a:rPr lang="hu-HU" dirty="0"/>
+              <a:t>”</a:t>
+            </a:r>
+          </a:p>
+        </p:txBody>
+      </p:sp>
+      <p:sp>
+        <p:nvSpPr>
+          <p:cNvPr id="3" name="Tartalom helye 2">
+            <a:extLst>
+              <a:ext uri="{FF2B5EF4-FFF2-40B4-BE49-F238E27FC236}">
+                <a16:creationId xmlns:a16="http://schemas.microsoft.com/office/drawing/2014/main" id="{CBE286D8-F8A4-427D-9830-6B80C1147C11}"/>
+              </a:ext>
+            </a:extLst>
+          </p:cNvPr>
+          <p:cNvSpPr>
+            <a:spLocks noGrp="1"/>
+          </p:cNvSpPr>
+          <p:nvPr>
+            <p:ph idx="1"/>
+          </p:nvPr>
+        </p:nvSpPr>
+        <p:spPr/>
+        <p:txBody>
+          <a:bodyPr/>
+          <a:lstStyle/>
+          <a:p>
+            <a:r>
+              <a:rPr lang="hu-HU" dirty="0"/>
+              <a:t>Ha több modul </a:t>
+            </a:r>
+            <a:r>
+              <a:rPr lang="hu-HU" b="1" dirty="0"/>
+              <a:t>egyszerre</a:t>
+            </a:r>
+            <a:r>
+              <a:rPr lang="hu-HU" dirty="0"/>
+              <a:t> hajt végre mozgást, az egy </a:t>
+            </a:r>
+            <a:r>
+              <a:rPr lang="hu-HU" b="1" dirty="0" err="1"/>
+              <a:t>transformation</a:t>
+            </a:r>
+            <a:r>
+              <a:rPr lang="hu-HU" dirty="0"/>
+              <a:t> (átalakítás).</a:t>
+            </a:r>
+          </a:p>
+          <a:p>
+            <a:r>
+              <a:rPr lang="hu-HU" dirty="0"/>
+              <a:t>Minden </a:t>
+            </a:r>
+            <a:r>
+              <a:rPr lang="hu-HU" dirty="0" err="1"/>
+              <a:t>slide</a:t>
+            </a:r>
+            <a:r>
+              <a:rPr lang="hu-HU" dirty="0"/>
+              <a:t> és </a:t>
+            </a:r>
+            <a:r>
+              <a:rPr lang="hu-HU" dirty="0" err="1"/>
+              <a:t>convex</a:t>
+            </a:r>
+            <a:r>
+              <a:rPr lang="hu-HU" dirty="0"/>
+              <a:t> </a:t>
+            </a:r>
+            <a:r>
+              <a:rPr lang="hu-HU" dirty="0" err="1"/>
+              <a:t>transition</a:t>
+            </a:r>
+            <a:r>
+              <a:rPr lang="hu-HU" dirty="0"/>
+              <a:t> </a:t>
+            </a:r>
+            <a:r>
+              <a:rPr lang="hu-HU" b="1" dirty="0"/>
+              <a:t>ugyanannyi időbe telik</a:t>
+            </a:r>
+            <a:r>
+              <a:rPr lang="hu-HU" dirty="0"/>
+              <a:t>.</a:t>
+            </a:r>
+          </a:p>
+          <a:p>
+            <a:r>
+              <a:rPr lang="hu-HU" dirty="0"/>
+              <a:t>Egy teljes </a:t>
+            </a:r>
+            <a:r>
+              <a:rPr lang="hu-HU" b="1" dirty="0"/>
+              <a:t>sorozat</a:t>
+            </a:r>
+            <a:r>
+              <a:rPr lang="hu-HU" dirty="0"/>
+              <a:t> ezekből a </a:t>
+            </a:r>
+            <a:r>
+              <a:rPr lang="hu-HU" dirty="0" err="1"/>
+              <a:t>transformation-ökből</a:t>
+            </a:r>
+            <a:r>
+              <a:rPr lang="hu-HU" dirty="0"/>
+              <a:t> egy </a:t>
+            </a:r>
+            <a:r>
+              <a:rPr lang="hu-HU" b="1" dirty="0" err="1"/>
+              <a:t>schedule</a:t>
+            </a:r>
+            <a:r>
+              <a:rPr lang="hu-HU" b="1" dirty="0"/>
+              <a:t> (ütemezés)</a:t>
+            </a:r>
+            <a:r>
+              <a:rPr lang="hu-HU" dirty="0"/>
+              <a:t>.</a:t>
+            </a:r>
+          </a:p>
+          <a:p>
+            <a:r>
+              <a:rPr lang="hu-HU" dirty="0"/>
+              <a:t>Egy </a:t>
+            </a:r>
+            <a:r>
+              <a:rPr lang="hu-HU" b="1" dirty="0" err="1"/>
+              <a:t>schedule</a:t>
+            </a:r>
+            <a:r>
+              <a:rPr lang="hu-HU" b="1" dirty="0"/>
+              <a:t> akkor legális</a:t>
+            </a:r>
+            <a:r>
+              <a:rPr lang="hu-HU" dirty="0"/>
+              <a:t>, ha:</a:t>
+            </a:r>
+          </a:p>
+          <a:p>
+            <a:pPr lvl="1"/>
+            <a:r>
+              <a:rPr lang="hu-HU" dirty="0"/>
+              <a:t>minden pillanatban megmarad az összefüggés (</a:t>
+            </a:r>
+            <a:r>
+              <a:rPr lang="hu-HU" dirty="0" err="1"/>
+              <a:t>connectivity</a:t>
+            </a:r>
+            <a:r>
+              <a:rPr lang="hu-HU" dirty="0"/>
+              <a:t>),</a:t>
+            </a:r>
+          </a:p>
+          <a:p>
+            <a:pPr lvl="1"/>
+            <a:r>
+              <a:rPr lang="hu-HU" dirty="0"/>
+              <a:t> nincs ütközés (</a:t>
+            </a:r>
+            <a:r>
+              <a:rPr lang="hu-HU" dirty="0" err="1"/>
+              <a:t>collision</a:t>
+            </a:r>
+            <a:r>
+              <a:rPr lang="hu-HU" dirty="0"/>
+              <a:t>).</a:t>
+            </a:r>
+          </a:p>
+          <a:p>
+            <a:endParaRPr lang="hu-HU" dirty="0"/>
+          </a:p>
+        </p:txBody>
+      </p:sp>
+    </p:spTree>
+    <p:extLst>
+      <p:ext uri="{BB962C8B-B14F-4D97-AF65-F5344CB8AC3E}">
+        <p14:creationId xmlns:p14="http://schemas.microsoft.com/office/powerpoint/2010/main" val="2703296481"/>
+      </p:ext>
+    </p:extLst>
+  </p:cSld>
+  <p:clrMapOvr>
+    <a:masterClrMapping/>
+  </p:clrMapOvr>
+</p:sld>
+</file>
+
+<file path=ppt/slides/slide12.xml><?xml version="1.0" encoding="utf-8"?>
+<p:sld xmlns:a="http://schemas.openxmlformats.org/drawingml/2006/main" xmlns:r="http://schemas.openxmlformats.org/officeDocument/2006/relationships" xmlns:p="http://schemas.openxmlformats.org/presentationml/2006/main">
+  <p:cSld>
+    <p:spTree>
+      <p:nvGrpSpPr>
+        <p:cNvPr id="1" name=""/>
+        <p:cNvGrpSpPr/>
+        <p:nvPr/>
+      </p:nvGrpSpPr>
+      <p:grpSpPr>
+        <a:xfrm>
+          <a:off x="0" y="0"/>
+          <a:ext cx="0" cy="0"/>
+          <a:chOff x="0" y="0"/>
+          <a:chExt cx="0" cy="0"/>
+        </a:xfrm>
+      </p:grpSpPr>
+      <p:sp>
+        <p:nvSpPr>
+          <p:cNvPr id="2" name="Cím 1">
+            <a:extLst>
+              <a:ext uri="{FF2B5EF4-FFF2-40B4-BE49-F238E27FC236}">
+                <a16:creationId xmlns:a16="http://schemas.microsoft.com/office/drawing/2014/main" id="{70280764-2A9C-86F2-1DC2-1696502C3AC9}"/>
+              </a:ext>
+            </a:extLst>
+          </p:cNvPr>
+          <p:cNvSpPr>
+            <a:spLocks noGrp="1"/>
+          </p:cNvSpPr>
+          <p:nvPr>
+            <p:ph type="title"/>
+          </p:nvPr>
+        </p:nvSpPr>
+        <p:spPr/>
+        <p:txBody>
+          <a:bodyPr/>
+          <a:lstStyle/>
+          <a:p>
+            <a:r>
+              <a:rPr lang="hu-HU" dirty="0"/>
+              <a:t>Kapcsolódás megőrzése (</a:t>
+            </a:r>
+            <a:r>
+              <a:rPr lang="hu-HU" dirty="0" err="1"/>
+              <a:t>connectivity</a:t>
+            </a:r>
+            <a:r>
+              <a:rPr lang="hu-HU" dirty="0"/>
+              <a:t> </a:t>
+            </a:r>
+            <a:r>
+              <a:rPr lang="hu-HU" dirty="0" err="1"/>
+              <a:t>preservation</a:t>
+            </a:r>
+            <a:r>
+              <a:rPr lang="hu-HU" dirty="0"/>
+              <a:t>)</a:t>
+            </a:r>
+          </a:p>
+        </p:txBody>
+      </p:sp>
+      <p:sp>
+        <p:nvSpPr>
+          <p:cNvPr id="3" name="Tartalom helye 2">
+            <a:extLst>
+              <a:ext uri="{FF2B5EF4-FFF2-40B4-BE49-F238E27FC236}">
+                <a16:creationId xmlns:a16="http://schemas.microsoft.com/office/drawing/2014/main" id="{DF649E12-5994-9E5E-6705-556539417C8E}"/>
+              </a:ext>
+            </a:extLst>
+          </p:cNvPr>
+          <p:cNvSpPr>
+            <a:spLocks noGrp="1"/>
+          </p:cNvSpPr>
+          <p:nvPr>
+            <p:ph idx="1"/>
+          </p:nvPr>
+        </p:nvSpPr>
+        <p:spPr/>
+        <p:txBody>
+          <a:bodyPr/>
+          <a:lstStyle/>
+          <a:p>
+            <a:r>
+              <a:rPr lang="hu-HU" dirty="0"/>
+              <a:t>A szerzők bevezetnek egy fontos fogalmat:</a:t>
+            </a:r>
+            <a:br>
+              <a:rPr lang="hu-HU" dirty="0"/>
+            </a:br>
+            <a:r>
+              <a:rPr lang="hu-HU" b="1" dirty="0"/>
+              <a:t>„</a:t>
+            </a:r>
+            <a:r>
+              <a:rPr lang="hu-HU" b="1" dirty="0" err="1"/>
+              <a:t>connected</a:t>
+            </a:r>
+            <a:r>
+              <a:rPr lang="hu-HU" b="1" dirty="0"/>
+              <a:t> </a:t>
+            </a:r>
+            <a:r>
+              <a:rPr lang="hu-HU" b="1" dirty="0" err="1"/>
+              <a:t>backbone</a:t>
+            </a:r>
+            <a:r>
+              <a:rPr lang="hu-HU" b="1" dirty="0"/>
+              <a:t>”</a:t>
+            </a:r>
+            <a:r>
+              <a:rPr lang="hu-HU" dirty="0"/>
+              <a:t> — azaz a konfiguráció „hátrahagyott váza”, ami mindig összefüggő marad.</a:t>
+            </a:r>
+          </a:p>
+          <a:p>
+            <a:r>
+              <a:rPr lang="hu-HU" dirty="0"/>
+              <a:t>Egy modulkészlet </a:t>
+            </a:r>
+            <a:r>
+              <a:rPr lang="hu-HU" b="1" dirty="0"/>
+              <a:t>szabad (free)</a:t>
+            </a:r>
+            <a:r>
+              <a:rPr lang="hu-HU" dirty="0"/>
+              <a:t>, ha azok eltávolítása után a maradék konfiguráció </a:t>
+            </a:r>
+            <a:r>
+              <a:rPr lang="hu-HU" b="1" dirty="0"/>
+              <a:t>még mindig érvényes</a:t>
+            </a:r>
+            <a:r>
+              <a:rPr lang="hu-HU" dirty="0"/>
+              <a:t>.</a:t>
+            </a:r>
+          </a:p>
+          <a:p>
+            <a:r>
+              <a:rPr lang="hu-HU" dirty="0"/>
+              <a:t>A párhuzamos mozgás (</a:t>
+            </a:r>
+            <a:r>
+              <a:rPr lang="hu-HU" b="1" dirty="0"/>
+              <a:t>C₁ → C₂</a:t>
+            </a:r>
+            <a:r>
+              <a:rPr lang="hu-HU" dirty="0"/>
+              <a:t>) csak akkor legális, ha a mozgó modulok halmaza </a:t>
+            </a:r>
+            <a:r>
+              <a:rPr lang="hu-HU" b="1" dirty="0"/>
+              <a:t>free</a:t>
+            </a:r>
+            <a:r>
+              <a:rPr lang="hu-HU" dirty="0"/>
+              <a:t>.</a:t>
+            </a:r>
+          </a:p>
+          <a:p>
+            <a:r>
+              <a:rPr lang="hu-HU" dirty="0"/>
+              <a:t>Ha nem, akkor a mozgás </a:t>
+            </a:r>
+            <a:r>
+              <a:rPr lang="hu-HU" b="1" dirty="0"/>
+              <a:t>megszakítja az összeköttetést</a:t>
+            </a:r>
+            <a:r>
+              <a:rPr lang="hu-HU" dirty="0"/>
+              <a:t> – ez </a:t>
+            </a:r>
+            <a:r>
+              <a:rPr lang="hu-HU" b="1" dirty="0"/>
+              <a:t>illegális</a:t>
+            </a:r>
+            <a:r>
+              <a:rPr lang="hu-HU" dirty="0"/>
+              <a:t>.</a:t>
+            </a:r>
+          </a:p>
+          <a:p>
+            <a:r>
+              <a:rPr lang="hu-HU" dirty="0"/>
+              <a:t>Ez biztosítja, hogy a robotrendszer mindig </a:t>
+            </a:r>
+            <a:r>
+              <a:rPr lang="hu-HU" b="1" dirty="0"/>
+              <a:t>egy darabban</a:t>
+            </a:r>
+            <a:r>
+              <a:rPr lang="hu-HU" dirty="0"/>
+              <a:t> marad, nem esik szét különálló csoportokra.</a:t>
+            </a:r>
+          </a:p>
+          <a:p>
+            <a:endParaRPr lang="hu-HU" dirty="0"/>
+          </a:p>
+        </p:txBody>
+      </p:sp>
+    </p:spTree>
+    <p:extLst>
+      <p:ext uri="{BB962C8B-B14F-4D97-AF65-F5344CB8AC3E}">
+        <p14:creationId xmlns:p14="http://schemas.microsoft.com/office/powerpoint/2010/main" val="3617994259"/>
+      </p:ext>
+    </p:extLst>
+  </p:cSld>
+  <p:clrMapOvr>
+    <a:masterClrMapping/>
+  </p:clrMapOvr>
+</p:sld>
+</file>
+
+<file path=ppt/slides/slide13.xml><?xml version="1.0" encoding="utf-8"?>
+<p:sld xmlns:a="http://schemas.openxmlformats.org/drawingml/2006/main" xmlns:r="http://schemas.openxmlformats.org/officeDocument/2006/relationships" xmlns:p="http://schemas.openxmlformats.org/presentationml/2006/main">
+  <p:cSld>
+    <p:spTree>
+      <p:nvGrpSpPr>
+        <p:cNvPr id="1" name=""/>
+        <p:cNvGrpSpPr/>
+        <p:nvPr/>
+      </p:nvGrpSpPr>
+      <p:grpSpPr>
+        <a:xfrm>
+          <a:off x="0" y="0"/>
+          <a:ext cx="0" cy="0"/>
+          <a:chOff x="0" y="0"/>
+          <a:chExt cx="0" cy="0"/>
+        </a:xfrm>
+      </p:grpSpPr>
+      <p:sp>
+        <p:nvSpPr>
+          <p:cNvPr id="2" name="Cím 1">
+            <a:extLst>
+              <a:ext uri="{FF2B5EF4-FFF2-40B4-BE49-F238E27FC236}">
+                <a16:creationId xmlns:a16="http://schemas.microsoft.com/office/drawing/2014/main" id="{2A1C311F-4FA7-49B4-7084-24943EC383DD}"/>
+              </a:ext>
+            </a:extLst>
+          </p:cNvPr>
+          <p:cNvSpPr>
+            <a:spLocks noGrp="1"/>
+          </p:cNvSpPr>
+          <p:nvPr>
+            <p:ph type="title"/>
+          </p:nvPr>
+        </p:nvSpPr>
+        <p:spPr/>
+        <p:txBody>
+          <a:bodyPr/>
+          <a:lstStyle/>
+          <a:p>
+            <a:r>
+              <a:rPr lang="hu-HU" dirty="0"/>
+              <a:t>Ütközések típusai </a:t>
+            </a:r>
+          </a:p>
+        </p:txBody>
+      </p:sp>
+      <p:sp>
+        <p:nvSpPr>
+          <p:cNvPr id="3" name="Tartalom helye 2">
+            <a:extLst>
+              <a:ext uri="{FF2B5EF4-FFF2-40B4-BE49-F238E27FC236}">
+                <a16:creationId xmlns:a16="http://schemas.microsoft.com/office/drawing/2014/main" id="{912FAE5C-49DF-2EB6-C3D2-49BA81E2A43B}"/>
+              </a:ext>
+            </a:extLst>
+          </p:cNvPr>
+          <p:cNvSpPr>
+            <a:spLocks noGrp="1"/>
+          </p:cNvSpPr>
+          <p:nvPr>
+            <p:ph idx="1"/>
+          </p:nvPr>
+        </p:nvSpPr>
+        <p:spPr/>
+        <p:txBody>
+          <a:bodyPr/>
+          <a:lstStyle/>
+          <a:p>
+            <a:r>
+              <a:rPr lang="hu-HU" dirty="0"/>
+              <a:t>Az algoritmus figyel a </a:t>
+            </a:r>
+            <a:r>
+              <a:rPr lang="hu-HU" b="1" dirty="0"/>
+              <a:t>mozgások közti ütközésekre</a:t>
+            </a:r>
+            <a:r>
+              <a:rPr lang="hu-HU" dirty="0"/>
+              <a:t>, ezek négy fajtába sorolhatók:</a:t>
+            </a:r>
+          </a:p>
+          <a:p>
+            <a:r>
+              <a:rPr lang="hu-HU" b="1" dirty="0"/>
+              <a:t>(i) Közös cél:</a:t>
+            </a:r>
+            <a:r>
+              <a:rPr lang="hu-HU" dirty="0"/>
+              <a:t> két modul </a:t>
+            </a:r>
+            <a:r>
+              <a:rPr lang="hu-HU" b="1" dirty="0"/>
+              <a:t>ugyanabba a cellába</a:t>
+            </a:r>
+            <a:r>
+              <a:rPr lang="hu-HU" dirty="0"/>
+              <a:t> menne → ütközés.</a:t>
+            </a:r>
+            <a:br>
+              <a:rPr lang="hu-HU" dirty="0"/>
+            </a:br>
+            <a:r>
+              <a:rPr lang="hu-HU" dirty="0"/>
+              <a:t>Vagy ha </a:t>
+            </a:r>
+            <a:r>
+              <a:rPr lang="hu-HU" b="1" dirty="0"/>
+              <a:t>helyet cserélnének (</a:t>
+            </a:r>
+            <a:r>
+              <a:rPr lang="hu-HU" b="1" dirty="0" err="1"/>
+              <a:t>swap</a:t>
+            </a:r>
+            <a:r>
+              <a:rPr lang="hu-HU" b="1" dirty="0"/>
+              <a:t>)</a:t>
+            </a:r>
+            <a:r>
+              <a:rPr lang="hu-HU" dirty="0"/>
+              <a:t> – ez is tiltott.</a:t>
+            </a:r>
+          </a:p>
+          <a:p>
+            <a:r>
+              <a:rPr lang="hu-HU" b="1" dirty="0"/>
+              <a:t>(ii) Közös átmeneti cella:</a:t>
+            </a:r>
+            <a:r>
+              <a:rPr lang="hu-HU" dirty="0"/>
+              <a:t> két </a:t>
+            </a:r>
+            <a:r>
+              <a:rPr lang="hu-HU" b="1" dirty="0" err="1"/>
+              <a:t>convex</a:t>
+            </a:r>
+            <a:r>
+              <a:rPr lang="hu-HU" b="1" dirty="0"/>
+              <a:t> </a:t>
+            </a:r>
+            <a:r>
+              <a:rPr lang="hu-HU" b="1" dirty="0" err="1"/>
+              <a:t>transition</a:t>
+            </a:r>
+            <a:r>
+              <a:rPr lang="hu-HU" dirty="0"/>
+              <a:t> áthalad ugyanazon közbenső cellán.</a:t>
+            </a:r>
+          </a:p>
+          <a:p>
+            <a:r>
+              <a:rPr lang="hu-HU" b="1" dirty="0"/>
+              <a:t>(iii) Ortogonális kereszt:</a:t>
+            </a:r>
+            <a:r>
+              <a:rPr lang="hu-HU" dirty="0"/>
+              <a:t> két </a:t>
+            </a:r>
+            <a:r>
+              <a:rPr lang="hu-HU" b="1" dirty="0" err="1"/>
+              <a:t>slide</a:t>
+            </a:r>
+            <a:r>
+              <a:rPr lang="hu-HU" dirty="0"/>
+              <a:t> úgy mozog, hogy az egyik </a:t>
+            </a:r>
+            <a:r>
+              <a:rPr lang="hu-HU" b="1" dirty="0"/>
+              <a:t>épp belép</a:t>
+            </a:r>
+            <a:r>
+              <a:rPr lang="hu-HU" dirty="0"/>
+              <a:t> abba a cellába, amit a másik </a:t>
+            </a:r>
+            <a:r>
+              <a:rPr lang="hu-HU" b="1" dirty="0"/>
+              <a:t>elhagy</a:t>
+            </a:r>
+            <a:r>
+              <a:rPr lang="hu-HU" dirty="0"/>
+              <a:t> → keresztezés.</a:t>
+            </a:r>
+          </a:p>
+          <a:p>
+            <a:r>
+              <a:rPr lang="hu-HU" b="1" dirty="0"/>
+              <a:t>(iv) </a:t>
+            </a:r>
+            <a:r>
+              <a:rPr lang="hu-HU" b="1" dirty="0" err="1"/>
+              <a:t>Slide</a:t>
+            </a:r>
+            <a:r>
+              <a:rPr lang="hu-HU" b="1" dirty="0"/>
+              <a:t> + </a:t>
+            </a:r>
+            <a:r>
+              <a:rPr lang="hu-HU" b="1" dirty="0" err="1"/>
+              <a:t>convex</a:t>
+            </a:r>
+            <a:r>
+              <a:rPr lang="hu-HU" b="1" dirty="0"/>
+              <a:t> ütközés:</a:t>
+            </a:r>
+            <a:r>
+              <a:rPr lang="hu-HU" dirty="0"/>
+              <a:t> a </a:t>
+            </a:r>
+            <a:r>
+              <a:rPr lang="hu-HU" b="1" dirty="0" err="1"/>
+              <a:t>slide</a:t>
+            </a:r>
+            <a:r>
+              <a:rPr lang="hu-HU" b="1" dirty="0"/>
+              <a:t> célcellája</a:t>
+            </a:r>
+            <a:r>
+              <a:rPr lang="hu-HU" dirty="0"/>
+              <a:t> éppen az, </a:t>
+            </a:r>
+            <a:r>
+              <a:rPr lang="hu-HU" b="1" dirty="0"/>
+              <a:t>ahonnan</a:t>
+            </a:r>
+            <a:r>
+              <a:rPr lang="hu-HU" dirty="0"/>
+              <a:t> a </a:t>
+            </a:r>
+            <a:r>
+              <a:rPr lang="hu-HU" dirty="0" err="1"/>
+              <a:t>convex</a:t>
+            </a:r>
+            <a:r>
+              <a:rPr lang="hu-HU" dirty="0"/>
+              <a:t> </a:t>
+            </a:r>
+            <a:r>
+              <a:rPr lang="hu-HU" dirty="0" err="1"/>
+              <a:t>transition</a:t>
+            </a:r>
+            <a:r>
+              <a:rPr lang="hu-HU" dirty="0"/>
+              <a:t> indul, és a két mozgás </a:t>
+            </a:r>
+            <a:r>
+              <a:rPr lang="hu-HU" b="1" dirty="0"/>
+              <a:t>merőleges irányban</a:t>
+            </a:r>
+            <a:r>
+              <a:rPr lang="hu-HU" dirty="0"/>
+              <a:t> történik.</a:t>
+            </a:r>
+          </a:p>
+          <a:p>
+            <a:endParaRPr lang="hu-HU" dirty="0"/>
+          </a:p>
+        </p:txBody>
+      </p:sp>
+    </p:spTree>
+    <p:extLst>
+      <p:ext uri="{BB962C8B-B14F-4D97-AF65-F5344CB8AC3E}">
+        <p14:creationId xmlns:p14="http://schemas.microsoft.com/office/powerpoint/2010/main" val="3088940233"/>
+      </p:ext>
+    </p:extLst>
+  </p:cSld>
+  <p:clrMapOvr>
+    <a:masterClrMapping/>
+  </p:clrMapOvr>
+</p:sld>
+</file>
+
+<file path=ppt/slides/slide14.xml><?xml version="1.0" encoding="utf-8"?>
+<p:sld xmlns:a="http://schemas.openxmlformats.org/drawingml/2006/main" xmlns:r="http://schemas.openxmlformats.org/officeDocument/2006/relationships" xmlns:p="http://schemas.openxmlformats.org/presentationml/2006/main">
+  <p:cSld>
+    <p:spTree>
+      <p:nvGrpSpPr>
+        <p:cNvPr id="1" name=""/>
+        <p:cNvGrpSpPr/>
+        <p:nvPr/>
+      </p:nvGrpSpPr>
+      <p:grpSpPr>
+        <a:xfrm>
+          <a:off x="0" y="0"/>
+          <a:ext cx="0" cy="0"/>
+          <a:chOff x="0" y="0"/>
+          <a:chExt cx="0" cy="0"/>
+        </a:xfrm>
+      </p:grpSpPr>
+      <p:sp>
+        <p:nvSpPr>
+          <p:cNvPr id="2" name="Cím 1">
+            <a:extLst>
+              <a:ext uri="{FF2B5EF4-FFF2-40B4-BE49-F238E27FC236}">
+                <a16:creationId xmlns:a16="http://schemas.microsoft.com/office/drawing/2014/main" id="{DB3F257C-1DC0-6840-D05B-E34628C34BCD}"/>
+              </a:ext>
+            </a:extLst>
+          </p:cNvPr>
+          <p:cNvSpPr>
+            <a:spLocks noGrp="1"/>
+          </p:cNvSpPr>
+          <p:nvPr>
+            <p:ph type="title"/>
+          </p:nvPr>
+        </p:nvSpPr>
+        <p:spPr/>
+        <p:txBody>
+          <a:bodyPr/>
+          <a:lstStyle/>
+          <a:p>
+            <a:r>
+              <a:rPr lang="hu-HU" dirty="0" err="1"/>
+              <a:t>Makespan</a:t>
+            </a:r>
+            <a:r>
+              <a:rPr lang="hu-HU" dirty="0"/>
+              <a:t> , In-</a:t>
+            </a:r>
+            <a:r>
+              <a:rPr lang="hu-HU" dirty="0" err="1"/>
+              <a:t>place</a:t>
+            </a:r>
+            <a:r>
+              <a:rPr lang="hu-HU" dirty="0"/>
+              <a:t> ütemezés</a:t>
+            </a:r>
+          </a:p>
+        </p:txBody>
+      </p:sp>
+      <p:sp>
+        <p:nvSpPr>
+          <p:cNvPr id="3" name="Tartalom helye 2">
+            <a:extLst>
+              <a:ext uri="{FF2B5EF4-FFF2-40B4-BE49-F238E27FC236}">
+                <a16:creationId xmlns:a16="http://schemas.microsoft.com/office/drawing/2014/main" id="{16643F0A-07E7-A3BB-3F78-14894EF2823C}"/>
+              </a:ext>
+            </a:extLst>
+          </p:cNvPr>
+          <p:cNvSpPr>
+            <a:spLocks noGrp="1"/>
+          </p:cNvSpPr>
+          <p:nvPr>
+            <p:ph idx="1"/>
+          </p:nvPr>
+        </p:nvSpPr>
+        <p:spPr/>
+        <p:txBody>
+          <a:bodyPr/>
+          <a:lstStyle/>
+          <a:p>
+            <a:r>
+              <a:rPr lang="hu-HU" dirty="0"/>
+              <a:t>A </a:t>
+            </a:r>
+            <a:r>
+              <a:rPr lang="hu-HU" dirty="0" err="1"/>
+              <a:t>makespan</a:t>
+            </a:r>
+            <a:r>
+              <a:rPr lang="hu-HU" dirty="0"/>
+              <a:t> = hány „lépésből” (</a:t>
+            </a:r>
+            <a:r>
+              <a:rPr lang="hu-HU" dirty="0" err="1"/>
+              <a:t>transformationből</a:t>
+            </a:r>
+            <a:r>
+              <a:rPr lang="hu-HU" dirty="0"/>
+              <a:t>) áll az egész átalakulás.</a:t>
+            </a:r>
+          </a:p>
+          <a:p>
+            <a:r>
+              <a:rPr lang="hu-HU" dirty="0"/>
+              <a:t>Cél: minél kisebb </a:t>
+            </a:r>
+            <a:r>
+              <a:rPr lang="hu-HU" dirty="0" err="1"/>
+              <a:t>makespan</a:t>
+            </a:r>
+            <a:r>
+              <a:rPr lang="hu-HU" dirty="0"/>
+              <a:t>.</a:t>
+            </a:r>
+          </a:p>
+          <a:p>
+            <a:r>
+              <a:rPr lang="hu-HU" dirty="0"/>
+              <a:t>B₁ = a kezdőkonfiguráció (C₁) határoló téglalapja</a:t>
+            </a:r>
+          </a:p>
+          <a:p>
+            <a:r>
+              <a:rPr lang="hu-HU" dirty="0"/>
+              <a:t>B₂ = a célkonfiguráció (C₂) határoló téglalapja</a:t>
+            </a:r>
+          </a:p>
+          <a:p>
+            <a:r>
+              <a:rPr lang="hu-HU" dirty="0"/>
+              <a:t>Ezek közös bal-alsó sarkot osztanak meg (hogy könnyebb legyen az összehasonlítás).</a:t>
+            </a:r>
+          </a:p>
+          <a:p>
+            <a:r>
+              <a:rPr lang="hu-HU" dirty="0"/>
+              <a:t>Egy ütemezés </a:t>
+            </a:r>
+            <a:r>
+              <a:rPr lang="hu-HU" b="1" dirty="0"/>
+              <a:t>in-</a:t>
+            </a:r>
+            <a:r>
+              <a:rPr lang="hu-HU" b="1" dirty="0" err="1"/>
+              <a:t>place</a:t>
+            </a:r>
+            <a:r>
+              <a:rPr lang="hu-HU" dirty="0"/>
+              <a:t>, ha az </a:t>
+            </a:r>
+            <a:r>
+              <a:rPr lang="hu-HU" b="1" dirty="0"/>
+              <a:t>átmeneti konfigurációk</a:t>
+            </a:r>
+            <a:r>
+              <a:rPr lang="hu-HU" dirty="0"/>
+              <a:t> nem nyúlnak ki </a:t>
+            </a:r>
+            <a:r>
+              <a:rPr lang="hu-HU" b="1" dirty="0"/>
+              <a:t>B₁ ∪ B₂</a:t>
+            </a:r>
+            <a:r>
+              <a:rPr lang="hu-HU" dirty="0"/>
+              <a:t> területéből </a:t>
+            </a:r>
+            <a:r>
+              <a:rPr lang="hu-HU" b="1" dirty="0"/>
+              <a:t>egynél több modulnyival</a:t>
+            </a:r>
+            <a:r>
+              <a:rPr lang="hu-HU" dirty="0"/>
+              <a:t>.</a:t>
+            </a:r>
+          </a:p>
+        </p:txBody>
+      </p:sp>
+    </p:spTree>
+    <p:extLst>
+      <p:ext uri="{BB962C8B-B14F-4D97-AF65-F5344CB8AC3E}">
+        <p14:creationId xmlns:p14="http://schemas.microsoft.com/office/powerpoint/2010/main" val="3412074446"/>
+      </p:ext>
+    </p:extLst>
+  </p:cSld>
+  <p:clrMapOvr>
+    <a:masterClrMapping/>
+  </p:clrMapOvr>
+</p:sld>
+</file>
+
+<file path=ppt/slides/slide15.xml><?xml version="1.0" encoding="utf-8"?>
+<p:sld xmlns:a="http://schemas.openxmlformats.org/drawingml/2006/main" xmlns:r="http://schemas.openxmlformats.org/officeDocument/2006/relationships" xmlns:p="http://schemas.openxmlformats.org/presentationml/2006/main">
+  <p:cSld>
+    <p:spTree>
+      <p:nvGrpSpPr>
+        <p:cNvPr id="1" name=""/>
+        <p:cNvGrpSpPr/>
+        <p:nvPr/>
+      </p:nvGrpSpPr>
+      <p:grpSpPr>
+        <a:xfrm>
+          <a:off x="0" y="0"/>
+          <a:ext cx="0" cy="0"/>
+          <a:chOff x="0" y="0"/>
+          <a:chExt cx="0" cy="0"/>
+        </a:xfrm>
+      </p:grpSpPr>
+      <p:sp>
+        <p:nvSpPr>
+          <p:cNvPr id="2" name="Cím 1">
+            <a:extLst>
+              <a:ext uri="{FF2B5EF4-FFF2-40B4-BE49-F238E27FC236}">
+                <a16:creationId xmlns:a16="http://schemas.microsoft.com/office/drawing/2014/main" id="{BB91AD04-6F18-D4F9-3AE5-AC3421333870}"/>
+              </a:ext>
+            </a:extLst>
+          </p:cNvPr>
+          <p:cNvSpPr>
+            <a:spLocks noGrp="1"/>
+          </p:cNvSpPr>
+          <p:nvPr>
+            <p:ph type="title"/>
+          </p:nvPr>
+        </p:nvSpPr>
+        <p:spPr/>
+        <p:txBody>
+          <a:bodyPr/>
+          <a:lstStyle/>
+          <a:p>
+            <a:r>
+              <a:rPr lang="hu-HU" dirty="0" err="1"/>
+              <a:t>Extended</a:t>
+            </a:r>
+            <a:r>
+              <a:rPr lang="hu-HU" dirty="0"/>
+              <a:t> </a:t>
+            </a:r>
+            <a:r>
+              <a:rPr lang="hu-HU" dirty="0" err="1"/>
+              <a:t>bounding</a:t>
+            </a:r>
+            <a:r>
+              <a:rPr lang="hu-HU" dirty="0"/>
+              <a:t> </a:t>
+            </a:r>
+            <a:r>
+              <a:rPr lang="hu-HU" dirty="0" err="1"/>
+              <a:t>box</a:t>
+            </a:r>
+            <a:r>
+              <a:rPr lang="hu-HU" dirty="0"/>
+              <a:t> (B′), </a:t>
+            </a:r>
+            <a:r>
+              <a:rPr lang="hu-HU" dirty="0" err="1"/>
+              <a:t>Weakly</a:t>
+            </a:r>
+            <a:r>
+              <a:rPr lang="hu-HU" dirty="0"/>
+              <a:t> in-</a:t>
+            </a:r>
+            <a:r>
+              <a:rPr lang="hu-HU" dirty="0" err="1"/>
+              <a:t>place</a:t>
+            </a:r>
+            <a:endParaRPr lang="hu-HU" dirty="0"/>
+          </a:p>
+        </p:txBody>
+      </p:sp>
+      <p:sp>
+        <p:nvSpPr>
+          <p:cNvPr id="3" name="Tartalom helye 2">
+            <a:extLst>
+              <a:ext uri="{FF2B5EF4-FFF2-40B4-BE49-F238E27FC236}">
+                <a16:creationId xmlns:a16="http://schemas.microsoft.com/office/drawing/2014/main" id="{0F5B5B82-B00F-EDA5-9F97-B1599DDD4DA2}"/>
+              </a:ext>
+            </a:extLst>
+          </p:cNvPr>
+          <p:cNvSpPr>
+            <a:spLocks noGrp="1"/>
+          </p:cNvSpPr>
+          <p:nvPr>
+            <p:ph idx="1"/>
+          </p:nvPr>
+        </p:nvSpPr>
+        <p:spPr/>
+        <p:txBody>
+          <a:bodyPr/>
+          <a:lstStyle/>
+          <a:p>
+            <a:r>
+              <a:rPr lang="hu-HU" dirty="0"/>
+              <a:t>A technikai számítások miatt a szerzők egy </a:t>
+            </a:r>
+            <a:r>
+              <a:rPr lang="hu-HU" b="1" dirty="0"/>
+              <a:t>kibővített </a:t>
+            </a:r>
+            <a:r>
+              <a:rPr lang="hu-HU" b="1" dirty="0" err="1"/>
+              <a:t>bounding</a:t>
+            </a:r>
+            <a:r>
+              <a:rPr lang="hu-HU" b="1" dirty="0"/>
+              <a:t> </a:t>
+            </a:r>
+            <a:r>
+              <a:rPr lang="hu-HU" b="1" dirty="0" err="1"/>
+              <a:t>boxot</a:t>
+            </a:r>
+            <a:r>
+              <a:rPr lang="hu-HU" dirty="0"/>
+              <a:t> használnak:</a:t>
+            </a:r>
+          </a:p>
+          <a:p>
+            <a:pPr lvl="1"/>
+            <a:r>
+              <a:rPr lang="hu-HU" dirty="0"/>
+              <a:t>a doboz méretei </a:t>
+            </a:r>
+            <a:r>
+              <a:rPr lang="hu-HU" b="1" dirty="0"/>
+              <a:t>3-mal oszthatók</a:t>
+            </a:r>
+            <a:r>
+              <a:rPr lang="hu-HU" dirty="0"/>
+              <a:t>,</a:t>
+            </a:r>
+          </a:p>
+          <a:p>
+            <a:pPr lvl="1"/>
+            <a:r>
+              <a:rPr lang="hu-HU" dirty="0"/>
+              <a:t>és van </a:t>
+            </a:r>
+            <a:r>
+              <a:rPr lang="hu-HU" b="1" dirty="0"/>
+              <a:t>3 egységnyi üres oszlop</a:t>
+            </a:r>
+            <a:r>
+              <a:rPr lang="hu-HU" dirty="0"/>
+              <a:t> a jobb szélen,</a:t>
+            </a:r>
+          </a:p>
+          <a:p>
+            <a:pPr lvl="1"/>
+            <a:r>
+              <a:rPr lang="hu-HU" dirty="0"/>
+              <a:t>így minden mozgás matematikailag egyszerűbben kezelhető.</a:t>
+            </a:r>
+          </a:p>
+          <a:p>
+            <a:r>
+              <a:rPr lang="hu-HU" dirty="0"/>
+              <a:t>Egy ütemezés </a:t>
+            </a:r>
+            <a:r>
+              <a:rPr lang="hu-HU" b="1" dirty="0" err="1"/>
+              <a:t>weakly</a:t>
+            </a:r>
+            <a:r>
+              <a:rPr lang="hu-HU" b="1" dirty="0"/>
+              <a:t> in-</a:t>
+            </a:r>
+            <a:r>
+              <a:rPr lang="hu-HU" b="1" dirty="0" err="1"/>
+              <a:t>place</a:t>
+            </a:r>
+            <a:r>
+              <a:rPr lang="hu-HU" dirty="0"/>
+              <a:t>, ha az átmeneti állapotok </a:t>
+            </a:r>
+            <a:r>
+              <a:rPr lang="hu-HU" b="1" dirty="0"/>
+              <a:t>csak egy kis, konstans mértékben</a:t>
+            </a:r>
+            <a:r>
+              <a:rPr lang="hu-HU" dirty="0"/>
+              <a:t> (néhány cellányival) lépnek ki a kibővített B₁′ ∪ B₂′ területéből.</a:t>
+            </a:r>
+          </a:p>
+          <a:p>
+            <a:endParaRPr lang="hu-HU" dirty="0"/>
+          </a:p>
+        </p:txBody>
+      </p:sp>
+    </p:spTree>
+    <p:extLst>
+      <p:ext uri="{BB962C8B-B14F-4D97-AF65-F5344CB8AC3E}">
+        <p14:creationId xmlns:p14="http://schemas.microsoft.com/office/powerpoint/2010/main" val="313650183"/>
+      </p:ext>
+    </p:extLst>
+  </p:cSld>
+  <p:clrMapOvr>
+    <a:masterClrMapping/>
+  </p:clrMapOvr>
+</p:sld>
+</file>
+
 <file path=ppt/slides/slide2.xml><?xml version="1.0" encoding="utf-8"?>
 <p:sld xmlns:a="http://schemas.openxmlformats.org/drawingml/2006/main" xmlns:r="http://schemas.openxmlformats.org/officeDocument/2006/relationships" xmlns:p="http://schemas.openxmlformats.org/presentationml/2006/main">
   <p:cSld>
@@ -13658,8 +15084,8 @@
           </a:p>
         </p:txBody>
       </p:sp>
-      <mc:AlternateContent xmlns:mc="http://schemas.openxmlformats.org/markup-compatibility/2006">
-        <mc:Choice xmlns:a14="http://schemas.microsoft.com/office/drawing/2010/main" Requires="a14">
+      <mc:AlternateContent xmlns:mc="http://schemas.openxmlformats.org/markup-compatibility/2006" xmlns:a14="http://schemas.microsoft.com/office/drawing/2010/main">
+        <mc:Choice Requires="a14">
           <p:sp>
             <p:nvSpPr>
               <p:cNvPr id="3" name="Tartalom helye 2">
@@ -13695,7 +15121,9 @@
                 <a14:m>
                   <m:oMath xmlns:m="http://schemas.openxmlformats.org/officeDocument/2006/math">
                     <m:r>
-                      <a:rPr lang="hu-HU" i="1"/>
+                      <a:rPr lang="hu-HU" i="1">
+                        <a:latin typeface="Cambria Math" panose="02040503050406030204" pitchFamily="18" charset="0"/>
+                      </a:rPr>
                       <m:t>𝑛</m:t>
                     </m:r>
                     <m:r>
@@ -13776,7 +15204,7 @@
             </p:txBody>
           </p:sp>
         </mc:Choice>
-        <mc:Fallback>
+        <mc:Fallback xmlns="">
           <p:sp>
             <p:nvSpPr>
               <p:cNvPr id="3" name="Tartalom helye 2">
@@ -14424,10 +15852,134 @@
         </p:nvSpPr>
         <p:spPr/>
         <p:txBody>
-          <a:bodyPr/>
+          <a:bodyPr>
+            <a:normAutofit lnSpcReduction="10000"/>
+          </a:bodyPr>
           <a:lstStyle/>
           <a:p>
+            <a:r>
+              <a:rPr lang="hu-HU" dirty="0"/>
+              <a:t>Címkézetlen (</a:t>
+            </a:r>
+            <a:r>
+              <a:rPr lang="hu-HU" dirty="0" err="1"/>
+              <a:t>unlabeled</a:t>
+            </a:r>
+            <a:r>
+              <a:rPr lang="hu-HU" dirty="0"/>
+              <a:t>) eset:</a:t>
+            </a:r>
+          </a:p>
+          <a:p>
+            <a:pPr lvl="1"/>
+            <a:r>
+              <a:rPr lang="hu-HU" dirty="0"/>
+              <a:t>Már a </a:t>
+            </a:r>
+            <a:r>
+              <a:rPr lang="hu-HU" dirty="0" err="1"/>
+              <a:t>makespan</a:t>
+            </a:r>
+            <a:r>
+              <a:rPr lang="hu-HU" dirty="0"/>
+              <a:t> = 1 ütemezés eldöntése is NP-teljes</a:t>
+            </a:r>
+          </a:p>
+          <a:p>
+            <a:r>
+              <a:rPr lang="hu-HU" dirty="0"/>
+              <a:t>Címkézett (</a:t>
+            </a:r>
+            <a:r>
+              <a:rPr lang="hu-HU" dirty="0" err="1"/>
+              <a:t>labeled</a:t>
+            </a:r>
+            <a:r>
+              <a:rPr lang="hu-HU" dirty="0"/>
+              <a:t>) eset:</a:t>
+            </a:r>
+          </a:p>
+          <a:p>
+            <a:pPr lvl="1"/>
+            <a:r>
+              <a:rPr lang="hu-HU" dirty="0" err="1"/>
+              <a:t>makespan</a:t>
+            </a:r>
+            <a:r>
+              <a:rPr lang="hu-HU" dirty="0"/>
+              <a:t> = 1 → </a:t>
+            </a:r>
+            <a:r>
+              <a:rPr lang="hu-HU" dirty="0" err="1"/>
+              <a:t>polinomiális</a:t>
+            </a:r>
+            <a:r>
+              <a:rPr lang="hu-HU" dirty="0"/>
+              <a:t> időben megoldható</a:t>
+            </a:r>
+          </a:p>
+          <a:p>
+            <a:pPr lvl="1"/>
+            <a:r>
+              <a:rPr lang="hu-HU" dirty="0" err="1"/>
+              <a:t>makespan</a:t>
+            </a:r>
+            <a:r>
+              <a:rPr lang="hu-HU" dirty="0"/>
+              <a:t> = 2 → NP-teljes</a:t>
+            </a:r>
+          </a:p>
+          <a:p>
+            <a:pPr lvl="1"/>
             <a:endParaRPr lang="hu-HU" dirty="0"/>
+          </a:p>
+          <a:p>
+            <a:r>
+              <a:rPr lang="hu-HU" dirty="0"/>
+              <a:t>Az új algoritmus áttörést jelent, mert</a:t>
+            </a:r>
+            <a:br>
+              <a:rPr lang="hu-HU" dirty="0"/>
+            </a:br>
+            <a:r>
+              <a:rPr lang="hu-HU" b="1" dirty="0"/>
+              <a:t>a szekvenciális módszerektől elmozdul a párhuzamos, optimalizált </a:t>
+            </a:r>
+            <a:r>
+              <a:rPr lang="hu-HU" b="1" dirty="0" err="1"/>
+              <a:t>reconfiguráció</a:t>
+            </a:r>
+            <a:r>
+              <a:rPr lang="hu-HU" b="1" dirty="0"/>
+              <a:t> felé</a:t>
+            </a:r>
+            <a:r>
+              <a:rPr lang="hu-HU" dirty="0"/>
+              <a:t>,</a:t>
+            </a:r>
+            <a:br>
+              <a:rPr lang="hu-HU" dirty="0"/>
+            </a:br>
+            <a:r>
+              <a:rPr lang="hu-HU" dirty="0"/>
+              <a:t>amely </a:t>
+            </a:r>
+            <a:r>
+              <a:rPr lang="hu-HU" b="1" dirty="0"/>
+              <a:t>elméletileg optimális</a:t>
+            </a:r>
+            <a:r>
+              <a:rPr lang="hu-HU" dirty="0"/>
+              <a:t> és </a:t>
+            </a:r>
+            <a:r>
+              <a:rPr lang="hu-HU" b="1" dirty="0"/>
+              <a:t>gyakorlatban is megvalósítható</a:t>
+            </a:r>
+            <a:r>
+              <a:rPr lang="hu-HU" dirty="0"/>
+              <a:t>.</a:t>
+            </a:r>
           </a:p>
         </p:txBody>
       </p:sp>
@@ -14435,6 +15987,544 @@
     <p:extLst>
       <p:ext uri="{BB962C8B-B14F-4D97-AF65-F5344CB8AC3E}">
         <p14:creationId xmlns:p14="http://schemas.microsoft.com/office/powerpoint/2010/main" val="1810080422"/>
+      </p:ext>
+    </p:extLst>
+  </p:cSld>
+  <p:clrMapOvr>
+    <a:masterClrMapping/>
+  </p:clrMapOvr>
+</p:sld>
+</file>
+
+<file path=ppt/slides/slide7.xml><?xml version="1.0" encoding="utf-8"?>
+<p:sld xmlns:a="http://schemas.openxmlformats.org/drawingml/2006/main" xmlns:r="http://schemas.openxmlformats.org/officeDocument/2006/relationships" xmlns:p="http://schemas.openxmlformats.org/presentationml/2006/main">
+  <p:cSld>
+    <p:spTree>
+      <p:nvGrpSpPr>
+        <p:cNvPr id="1" name=""/>
+        <p:cNvGrpSpPr/>
+        <p:nvPr/>
+      </p:nvGrpSpPr>
+      <p:grpSpPr>
+        <a:xfrm>
+          <a:off x="0" y="0"/>
+          <a:ext cx="0" cy="0"/>
+          <a:chOff x="0" y="0"/>
+          <a:chExt cx="0" cy="0"/>
+        </a:xfrm>
+      </p:grpSpPr>
+      <p:sp>
+        <p:nvSpPr>
+          <p:cNvPr id="2" name="Cím 1">
+            <a:extLst>
+              <a:ext uri="{FF2B5EF4-FFF2-40B4-BE49-F238E27FC236}">
+                <a16:creationId xmlns:a16="http://schemas.microsoft.com/office/drawing/2014/main" id="{5AE194FB-7152-4636-160C-3FC975307F12}"/>
+              </a:ext>
+            </a:extLst>
+          </p:cNvPr>
+          <p:cNvSpPr>
+            <a:spLocks noGrp="1"/>
+          </p:cNvSpPr>
+          <p:nvPr>
+            <p:ph type="ctrTitle"/>
+          </p:nvPr>
+        </p:nvSpPr>
+        <p:spPr>
+          <a:xfrm>
+            <a:off x="1310403" y="1925997"/>
+            <a:ext cx="8825658" cy="2677648"/>
+          </a:xfrm>
+        </p:spPr>
+        <p:txBody>
+          <a:bodyPr/>
+          <a:lstStyle/>
+          <a:p>
+            <a:pPr algn="ctr"/>
+            <a:r>
+              <a:rPr lang="hu-HU" b="1" dirty="0"/>
+              <a:t>Modell definíciója</a:t>
+            </a:r>
+            <a:r>
+              <a:rPr lang="hu-HU" dirty="0"/>
+              <a:t>, </a:t>
+            </a:r>
+            <a:r>
+              <a:rPr lang="hu-HU" b="1" dirty="0"/>
+              <a:t>a mozgások szabályai</a:t>
+            </a:r>
+            <a:r>
+              <a:rPr lang="hu-HU" dirty="0"/>
+              <a:t>, és </a:t>
+            </a:r>
+            <a:r>
+              <a:rPr lang="hu-HU" b="1" dirty="0"/>
+              <a:t>az ütközések típusai</a:t>
+            </a:r>
+            <a:endParaRPr lang="hu-HU" dirty="0"/>
+          </a:p>
+        </p:txBody>
+      </p:sp>
+    </p:spTree>
+    <p:extLst>
+      <p:ext uri="{BB962C8B-B14F-4D97-AF65-F5344CB8AC3E}">
+        <p14:creationId xmlns:p14="http://schemas.microsoft.com/office/powerpoint/2010/main" val="2678667780"/>
+      </p:ext>
+    </p:extLst>
+  </p:cSld>
+  <p:clrMapOvr>
+    <a:masterClrMapping/>
+  </p:clrMapOvr>
+</p:sld>
+</file>
+
+<file path=ppt/slides/slide8.xml><?xml version="1.0" encoding="utf-8"?>
+<p:sld xmlns:a="http://schemas.openxmlformats.org/drawingml/2006/main" xmlns:r="http://schemas.openxmlformats.org/officeDocument/2006/relationships" xmlns:p="http://schemas.openxmlformats.org/presentationml/2006/main">
+  <p:cSld>
+    <p:spTree>
+      <p:nvGrpSpPr>
+        <p:cNvPr id="1" name=""/>
+        <p:cNvGrpSpPr/>
+        <p:nvPr/>
+      </p:nvGrpSpPr>
+      <p:grpSpPr>
+        <a:xfrm>
+          <a:off x="0" y="0"/>
+          <a:ext cx="0" cy="0"/>
+          <a:chOff x="0" y="0"/>
+          <a:chExt cx="0" cy="0"/>
+        </a:xfrm>
+      </p:grpSpPr>
+      <p:sp>
+        <p:nvSpPr>
+          <p:cNvPr id="2" name="Cím 1">
+            <a:extLst>
+              <a:ext uri="{FF2B5EF4-FFF2-40B4-BE49-F238E27FC236}">
+                <a16:creationId xmlns:a16="http://schemas.microsoft.com/office/drawing/2014/main" id="{5538D030-A95E-3F12-DE50-BD4FDA928653}"/>
+              </a:ext>
+            </a:extLst>
+          </p:cNvPr>
+          <p:cNvSpPr>
+            <a:spLocks noGrp="1"/>
+          </p:cNvSpPr>
+          <p:nvPr>
+            <p:ph type="title"/>
+          </p:nvPr>
+        </p:nvSpPr>
+        <p:spPr/>
+        <p:txBody>
+          <a:bodyPr/>
+          <a:lstStyle/>
+          <a:p>
+            <a:r>
+              <a:rPr lang="hu-HU" dirty="0"/>
+              <a:t>A kutatás alapja: a rácsmodell (</a:t>
+            </a:r>
+            <a:r>
+              <a:rPr lang="hu-HU" dirty="0" err="1"/>
+              <a:t>grid</a:t>
+            </a:r>
+            <a:r>
+              <a:rPr lang="hu-HU" dirty="0"/>
+              <a:t> </a:t>
+            </a:r>
+            <a:r>
+              <a:rPr lang="hu-HU" dirty="0" err="1"/>
+              <a:t>model</a:t>
+            </a:r>
+            <a:r>
+              <a:rPr lang="hu-HU" dirty="0"/>
+              <a:t>)</a:t>
+            </a:r>
+          </a:p>
+        </p:txBody>
+      </p:sp>
+      <p:sp>
+        <p:nvSpPr>
+          <p:cNvPr id="3" name="Tartalom helye 2">
+            <a:extLst>
+              <a:ext uri="{FF2B5EF4-FFF2-40B4-BE49-F238E27FC236}">
+                <a16:creationId xmlns:a16="http://schemas.microsoft.com/office/drawing/2014/main" id="{4CB1A39C-6AEA-CAC2-7857-3E396C519302}"/>
+              </a:ext>
+            </a:extLst>
+          </p:cNvPr>
+          <p:cNvSpPr>
+            <a:spLocks noGrp="1"/>
+          </p:cNvSpPr>
+          <p:nvPr>
+            <p:ph idx="1"/>
+          </p:nvPr>
+        </p:nvSpPr>
+        <p:spPr/>
+        <p:txBody>
+          <a:bodyPr>
+            <a:normAutofit lnSpcReduction="10000"/>
+          </a:bodyPr>
+          <a:lstStyle/>
+          <a:p>
+            <a:r>
+              <a:rPr lang="hu-HU" dirty="0"/>
+              <a:t>A robotok (vagy modulok) </a:t>
+            </a:r>
+            <a:r>
+              <a:rPr lang="hu-HU" b="1" dirty="0"/>
+              <a:t>négyzet alakú egységek</a:t>
+            </a:r>
+            <a:r>
+              <a:rPr lang="hu-HU" dirty="0"/>
+              <a:t>, amelyek az </a:t>
+            </a:r>
+            <a:r>
+              <a:rPr lang="hu-HU" b="1" dirty="0"/>
+              <a:t>egész számok koordinátáival definiált rácson</a:t>
+            </a:r>
+            <a:r>
+              <a:rPr lang="hu-HU" dirty="0"/>
+              <a:t> (integer </a:t>
+            </a:r>
+            <a:r>
+              <a:rPr lang="hu-HU" dirty="0" err="1"/>
+              <a:t>grid</a:t>
+            </a:r>
+            <a:r>
+              <a:rPr lang="hu-HU" dirty="0"/>
+              <a:t>) helyezkednek el.</a:t>
+            </a:r>
+          </a:p>
+          <a:p>
+            <a:r>
+              <a:rPr lang="hu-HU" dirty="0"/>
+              <a:t>Minden cella (négyzet) </a:t>
+            </a:r>
+            <a:r>
+              <a:rPr lang="hu-HU" b="1" dirty="0"/>
+              <a:t>egyetlen modult</a:t>
+            </a:r>
+            <a:r>
+              <a:rPr lang="hu-HU" dirty="0"/>
+              <a:t> tartalmazhat.</a:t>
+            </a:r>
+          </a:p>
+          <a:p>
+            <a:r>
+              <a:rPr lang="hu-HU" dirty="0"/>
+              <a:t>Egy cellát a koordinátái azonosítanak: </a:t>
+            </a:r>
+            <a:r>
+              <a:rPr lang="hu-HU" b="1" dirty="0"/>
+              <a:t>x(u)</a:t>
+            </a:r>
+            <a:r>
+              <a:rPr lang="hu-HU" dirty="0"/>
+              <a:t>, </a:t>
+            </a:r>
+            <a:r>
+              <a:rPr lang="hu-HU" b="1" dirty="0"/>
+              <a:t>y(u)</a:t>
+            </a:r>
+            <a:r>
+              <a:rPr lang="hu-HU" dirty="0"/>
+              <a:t>.</a:t>
+            </a:r>
+          </a:p>
+          <a:p>
+            <a:r>
+              <a:rPr lang="hu-HU" dirty="0"/>
+              <a:t>A rács irányai:</a:t>
+            </a:r>
+          </a:p>
+          <a:p>
+            <a:pPr lvl="1"/>
+            <a:r>
+              <a:rPr lang="hu-HU" dirty="0"/>
+              <a:t>(1, 0) → </a:t>
+            </a:r>
+            <a:r>
+              <a:rPr lang="hu-HU" b="1" dirty="0"/>
+              <a:t>kelet</a:t>
+            </a:r>
+            <a:r>
+              <a:rPr lang="hu-HU" dirty="0"/>
+              <a:t>,</a:t>
+            </a:r>
+          </a:p>
+          <a:p>
+            <a:pPr lvl="1"/>
+            <a:r>
+              <a:rPr lang="hu-HU" dirty="0"/>
+              <a:t>(0, 1) → </a:t>
+            </a:r>
+            <a:r>
+              <a:rPr lang="hu-HU" b="1" dirty="0"/>
+              <a:t>észak</a:t>
+            </a:r>
+            <a:r>
+              <a:rPr lang="hu-HU" dirty="0"/>
+              <a:t>,</a:t>
+            </a:r>
+          </a:p>
+          <a:p>
+            <a:pPr lvl="1"/>
+            <a:r>
+              <a:rPr lang="hu-HU" dirty="0"/>
+              <a:t>a negatív irányok pedig </a:t>
+            </a:r>
+            <a:r>
+              <a:rPr lang="hu-HU" b="1" dirty="0"/>
+              <a:t>nyugat</a:t>
+            </a:r>
+            <a:r>
+              <a:rPr lang="hu-HU" dirty="0"/>
+              <a:t> és </a:t>
+            </a:r>
+            <a:r>
+              <a:rPr lang="hu-HU" b="1" dirty="0"/>
+              <a:t>dél</a:t>
+            </a:r>
+            <a:r>
+              <a:rPr lang="hu-HU" dirty="0"/>
+              <a:t>.</a:t>
+            </a:r>
+          </a:p>
+          <a:p>
+            <a:r>
+              <a:rPr lang="hu-HU" dirty="0"/>
+              <a:t>Ez azért fontos, mert az algoritmus ezekre a diszkrét koordinátákra építve írja le a mozgásokat.</a:t>
+            </a:r>
+          </a:p>
+        </p:txBody>
+      </p:sp>
+    </p:spTree>
+    <p:extLst>
+      <p:ext uri="{BB962C8B-B14F-4D97-AF65-F5344CB8AC3E}">
+        <p14:creationId xmlns:p14="http://schemas.microsoft.com/office/powerpoint/2010/main" val="2150719895"/>
+      </p:ext>
+    </p:extLst>
+  </p:cSld>
+  <p:clrMapOvr>
+    <a:masterClrMapping/>
+  </p:clrMapOvr>
+</p:sld>
+</file>
+
+<file path=ppt/slides/slide9.xml><?xml version="1.0" encoding="utf-8"?>
+<p:sld xmlns:a="http://schemas.openxmlformats.org/drawingml/2006/main" xmlns:r="http://schemas.openxmlformats.org/officeDocument/2006/relationships" xmlns:p="http://schemas.openxmlformats.org/presentationml/2006/main">
+  <p:cSld>
+    <p:spTree>
+      <p:nvGrpSpPr>
+        <p:cNvPr id="1" name=""/>
+        <p:cNvGrpSpPr/>
+        <p:nvPr/>
+      </p:nvGrpSpPr>
+      <p:grpSpPr>
+        <a:xfrm>
+          <a:off x="0" y="0"/>
+          <a:ext cx="0" cy="0"/>
+          <a:chOff x="0" y="0"/>
+          <a:chExt cx="0" cy="0"/>
+        </a:xfrm>
+      </p:grpSpPr>
+      <p:sp>
+        <p:nvSpPr>
+          <p:cNvPr id="2" name="Cím 1">
+            <a:extLst>
+              <a:ext uri="{FF2B5EF4-FFF2-40B4-BE49-F238E27FC236}">
+                <a16:creationId xmlns:a16="http://schemas.microsoft.com/office/drawing/2014/main" id="{5E6A60EB-3C81-3EFD-3F91-0C5A1511C7BF}"/>
+              </a:ext>
+            </a:extLst>
+          </p:cNvPr>
+          <p:cNvSpPr>
+            <a:spLocks noGrp="1"/>
+          </p:cNvSpPr>
+          <p:nvPr>
+            <p:ph type="title"/>
+          </p:nvPr>
+        </p:nvSpPr>
+        <p:spPr/>
+        <p:txBody>
+          <a:bodyPr/>
+          <a:lstStyle/>
+          <a:p>
+            <a:r>
+              <a:rPr lang="hu-HU" dirty="0"/>
+              <a:t>Szomszédság és kapcsolódás</a:t>
+            </a:r>
+          </a:p>
+        </p:txBody>
+      </p:sp>
+      <p:sp>
+        <p:nvSpPr>
+          <p:cNvPr id="3" name="Tartalom helye 2">
+            <a:extLst>
+              <a:ext uri="{FF2B5EF4-FFF2-40B4-BE49-F238E27FC236}">
+                <a16:creationId xmlns:a16="http://schemas.microsoft.com/office/drawing/2014/main" id="{002E4BEE-830F-6A07-BED0-B36106AEE715}"/>
+              </a:ext>
+            </a:extLst>
+          </p:cNvPr>
+          <p:cNvSpPr>
+            <a:spLocks noGrp="1"/>
+          </p:cNvSpPr>
+          <p:nvPr>
+            <p:ph idx="1"/>
+          </p:nvPr>
+        </p:nvSpPr>
+        <p:spPr/>
+        <p:txBody>
+          <a:bodyPr/>
+          <a:lstStyle/>
+          <a:p>
+            <a:r>
+              <a:rPr lang="hu-HU" dirty="0"/>
+              <a:t>A modulok közötti kapcsolatokat </a:t>
+            </a:r>
+            <a:r>
+              <a:rPr lang="hu-HU" b="1" dirty="0"/>
+              <a:t>szomszédsági viszonyokkal</a:t>
+            </a:r>
+            <a:r>
+              <a:rPr lang="hu-HU" dirty="0"/>
+              <a:t> írják le:</a:t>
+            </a:r>
+          </a:p>
+          <a:p>
+            <a:r>
+              <a:rPr lang="hu-HU" b="1" dirty="0"/>
+              <a:t>Edge-</a:t>
+            </a:r>
+            <a:r>
+              <a:rPr lang="hu-HU" b="1" dirty="0" err="1"/>
+              <a:t>adjacent</a:t>
+            </a:r>
+            <a:r>
+              <a:rPr lang="hu-HU" b="1" dirty="0"/>
+              <a:t> (élszomszédos):</a:t>
+            </a:r>
+            <a:r>
+              <a:rPr lang="hu-HU" dirty="0"/>
+              <a:t> két cella közös élt oszt meg.</a:t>
+            </a:r>
+          </a:p>
+          <a:p>
+            <a:r>
+              <a:rPr lang="hu-HU" b="1" dirty="0" err="1"/>
+              <a:t>Vertex-adjacent</a:t>
+            </a:r>
+            <a:r>
+              <a:rPr lang="hu-HU" b="1" dirty="0"/>
+              <a:t> (csúcsszomszédos):</a:t>
+            </a:r>
+            <a:r>
+              <a:rPr lang="hu-HU" dirty="0"/>
+              <a:t> csak a sarkuk ér össze → „</a:t>
+            </a:r>
+            <a:r>
+              <a:rPr lang="hu-HU" b="1" dirty="0"/>
+              <a:t>diagonálisan szomszédos</a:t>
+            </a:r>
+            <a:r>
+              <a:rPr lang="hu-HU" dirty="0"/>
+              <a:t>”.</a:t>
+            </a:r>
+          </a:p>
+          <a:p>
+            <a:r>
+              <a:rPr lang="hu-HU" dirty="0"/>
+              <a:t>A </a:t>
+            </a:r>
+            <a:r>
+              <a:rPr lang="hu-HU" b="1" dirty="0"/>
+              <a:t>konfiguráció (C)</a:t>
+            </a:r>
+            <a:r>
+              <a:rPr lang="hu-HU" dirty="0"/>
+              <a:t> az összes elfoglalt cella halmaza.</a:t>
+            </a:r>
+            <a:br>
+              <a:rPr lang="hu-HU" dirty="0"/>
+            </a:br>
+            <a:r>
+              <a:rPr lang="hu-HU" dirty="0"/>
+              <a:t>Egy konfiguráció </a:t>
+            </a:r>
+            <a:r>
+              <a:rPr lang="hu-HU" b="1" dirty="0"/>
+              <a:t>érvényes (</a:t>
+            </a:r>
+            <a:r>
+              <a:rPr lang="hu-HU" b="1" dirty="0" err="1"/>
+              <a:t>valid</a:t>
+            </a:r>
+            <a:r>
+              <a:rPr lang="hu-HU" b="1" dirty="0"/>
+              <a:t>)</a:t>
+            </a:r>
+            <a:r>
+              <a:rPr lang="hu-HU" dirty="0"/>
+              <a:t>, ha a cellák élszomszédos gráfja </a:t>
+            </a:r>
+            <a:r>
+              <a:rPr lang="hu-HU" b="1" dirty="0"/>
+              <a:t>összefüggő</a:t>
+            </a:r>
+            <a:r>
+              <a:rPr lang="hu-HU" dirty="0"/>
+              <a:t> (vagyis minden modul közvetve össze van kapcsolva).</a:t>
+            </a:r>
+          </a:p>
+          <a:p>
+            <a:r>
+              <a:rPr lang="hu-HU" dirty="0"/>
+              <a:t>Minden konfigurációhoz tartozik egy </a:t>
+            </a:r>
+            <a:r>
+              <a:rPr lang="hu-HU" b="1" dirty="0"/>
+              <a:t>legkisebb téglalap (</a:t>
+            </a:r>
+            <a:r>
+              <a:rPr lang="hu-HU" b="1" dirty="0" err="1"/>
+              <a:t>bounding</a:t>
+            </a:r>
+            <a:r>
+              <a:rPr lang="hu-HU" b="1" dirty="0"/>
+              <a:t> </a:t>
+            </a:r>
+            <a:r>
+              <a:rPr lang="hu-HU" b="1" dirty="0" err="1"/>
+              <a:t>box</a:t>
+            </a:r>
+            <a:r>
+              <a:rPr lang="hu-HU" b="1" dirty="0"/>
+              <a:t>)</a:t>
+            </a:r>
+            <a:r>
+              <a:rPr lang="hu-HU" dirty="0"/>
+              <a:t>, amely az összes modult lefedi, és </a:t>
+            </a:r>
+            <a:r>
+              <a:rPr lang="hu-HU" b="1" dirty="0"/>
+              <a:t>ennek a kerülete P</a:t>
+            </a:r>
+            <a:r>
+              <a:rPr lang="hu-HU" dirty="0"/>
+              <a:t> – ez a későbbi </a:t>
+            </a:r>
+            <a:r>
+              <a:rPr lang="hu-HU" i="1" dirty="0" err="1"/>
+              <a:t>makespan</a:t>
+            </a:r>
+            <a:r>
+              <a:rPr lang="hu-HU" dirty="0"/>
+              <a:t> számítás alapja.</a:t>
+            </a:r>
+          </a:p>
+          <a:p>
+            <a:endParaRPr lang="hu-HU" dirty="0"/>
+          </a:p>
+        </p:txBody>
+      </p:sp>
+    </p:spTree>
+    <p:extLst>
+      <p:ext uri="{BB962C8B-B14F-4D97-AF65-F5344CB8AC3E}">
+        <p14:creationId xmlns:p14="http://schemas.microsoft.com/office/powerpoint/2010/main" val="3939302917"/>
       </p:ext>
     </p:extLst>
   </p:cSld>

</xml_diff>

<commit_message>
adding IV. phase and Conlusions
</commit_message>
<xml_diff>
--- a/Sliding Squares in Parallel.pptx
+++ b/Sliding Squares in Parallel.pptx
@@ -4,6 +4,9 @@
   <p:sldMasterIdLst>
     <p:sldMasterId id="2147483678" r:id="rId1"/>
   </p:sldMasterIdLst>
+  <p:notesMasterIdLst>
+    <p:notesMasterId r:id="rId29"/>
+  </p:notesMasterIdLst>
   <p:sldIdLst>
     <p:sldId id="256" r:id="rId2"/>
     <p:sldId id="257" r:id="rId3"/>
@@ -27,6 +30,11 @@
     <p:sldId id="275" r:id="rId21"/>
     <p:sldId id="276" r:id="rId22"/>
     <p:sldId id="277" r:id="rId23"/>
+    <p:sldId id="278" r:id="rId24"/>
+    <p:sldId id="281" r:id="rId25"/>
+    <p:sldId id="279" r:id="rId26"/>
+    <p:sldId id="280" r:id="rId27"/>
+    <p:sldId id="282" r:id="rId28"/>
   </p:sldIdLst>
   <p:sldSz cx="12192000" cy="6858000"/>
   <p:notesSz cx="6858000" cy="9144000"/>
@@ -131,6 +139,449 @@
     </p:ext>
   </p:extLst>
 </p:presentation>
+</file>
+
+<file path=ppt/notesMasters/notesMaster1.xml><?xml version="1.0" encoding="utf-8"?>
+<p:notesMaster xmlns:a="http://schemas.openxmlformats.org/drawingml/2006/main" xmlns:r="http://schemas.openxmlformats.org/officeDocument/2006/relationships" xmlns:p="http://schemas.openxmlformats.org/presentationml/2006/main">
+  <p:cSld>
+    <p:bg>
+      <p:bgRef idx="1001">
+        <a:schemeClr val="bg1"/>
+      </p:bgRef>
+    </p:bg>
+    <p:spTree>
+      <p:nvGrpSpPr>
+        <p:cNvPr id="1" name=""/>
+        <p:cNvGrpSpPr/>
+        <p:nvPr/>
+      </p:nvGrpSpPr>
+      <p:grpSpPr>
+        <a:xfrm>
+          <a:off x="0" y="0"/>
+          <a:ext cx="0" cy="0"/>
+          <a:chOff x="0" y="0"/>
+          <a:chExt cx="0" cy="0"/>
+        </a:xfrm>
+      </p:grpSpPr>
+      <p:sp>
+        <p:nvSpPr>
+          <p:cNvPr id="2" name="Élőfej helye 1"/>
+          <p:cNvSpPr>
+            <a:spLocks noGrp="1"/>
+          </p:cNvSpPr>
+          <p:nvPr>
+            <p:ph type="hdr" sz="quarter"/>
+          </p:nvPr>
+        </p:nvSpPr>
+        <p:spPr>
+          <a:xfrm>
+            <a:off x="0" y="0"/>
+            <a:ext cx="2971800" cy="458788"/>
+          </a:xfrm>
+          <a:prstGeom prst="rect">
+            <a:avLst/>
+          </a:prstGeom>
+        </p:spPr>
+        <p:txBody>
+          <a:bodyPr vert="horz" lIns="91440" tIns="45720" rIns="91440" bIns="45720" rtlCol="0"/>
+          <a:lstStyle>
+            <a:lvl1pPr algn="l">
+              <a:defRPr sz="1200"/>
+            </a:lvl1pPr>
+          </a:lstStyle>
+          <a:p>
+            <a:endParaRPr lang="hu-HU"/>
+          </a:p>
+        </p:txBody>
+      </p:sp>
+      <p:sp>
+        <p:nvSpPr>
+          <p:cNvPr id="3" name="Dátum helye 2"/>
+          <p:cNvSpPr>
+            <a:spLocks noGrp="1"/>
+          </p:cNvSpPr>
+          <p:nvPr>
+            <p:ph type="dt" idx="1"/>
+          </p:nvPr>
+        </p:nvSpPr>
+        <p:spPr>
+          <a:xfrm>
+            <a:off x="3884613" y="0"/>
+            <a:ext cx="2971800" cy="458788"/>
+          </a:xfrm>
+          <a:prstGeom prst="rect">
+            <a:avLst/>
+          </a:prstGeom>
+        </p:spPr>
+        <p:txBody>
+          <a:bodyPr vert="horz" lIns="91440" tIns="45720" rIns="91440" bIns="45720" rtlCol="0"/>
+          <a:lstStyle>
+            <a:lvl1pPr algn="r">
+              <a:defRPr sz="1200"/>
+            </a:lvl1pPr>
+          </a:lstStyle>
+          <a:p>
+            <a:fld id="{1DFCED2E-F5CD-451B-B01E-56D2B61E67CA}" type="datetimeFigureOut">
+              <a:rPr lang="hu-HU" smtClean="0"/>
+              <a:t>2025. 10. 05.</a:t>
+            </a:fld>
+            <a:endParaRPr lang="hu-HU"/>
+          </a:p>
+        </p:txBody>
+      </p:sp>
+      <p:sp>
+        <p:nvSpPr>
+          <p:cNvPr id="4" name="Diakép helye 3"/>
+          <p:cNvSpPr>
+            <a:spLocks noGrp="1" noRot="1" noChangeAspect="1"/>
+          </p:cNvSpPr>
+          <p:nvPr>
+            <p:ph type="sldImg" idx="2"/>
+          </p:nvPr>
+        </p:nvSpPr>
+        <p:spPr>
+          <a:xfrm>
+            <a:off x="685800" y="1143000"/>
+            <a:ext cx="5486400" cy="3086100"/>
+          </a:xfrm>
+          <a:prstGeom prst="rect">
+            <a:avLst/>
+          </a:prstGeom>
+          <a:noFill/>
+          <a:ln w="12700">
+            <a:solidFill>
+              <a:prstClr val="black"/>
+            </a:solidFill>
+          </a:ln>
+        </p:spPr>
+        <p:txBody>
+          <a:bodyPr vert="horz" lIns="91440" tIns="45720" rIns="91440" bIns="45720" rtlCol="0" anchor="ctr"/>
+          <a:lstStyle/>
+          <a:p>
+            <a:endParaRPr lang="hu-HU"/>
+          </a:p>
+        </p:txBody>
+      </p:sp>
+      <p:sp>
+        <p:nvSpPr>
+          <p:cNvPr id="5" name="Jegyzetek helye 4"/>
+          <p:cNvSpPr>
+            <a:spLocks noGrp="1"/>
+          </p:cNvSpPr>
+          <p:nvPr>
+            <p:ph type="body" sz="quarter" idx="3"/>
+          </p:nvPr>
+        </p:nvSpPr>
+        <p:spPr>
+          <a:xfrm>
+            <a:off x="685800" y="4400550"/>
+            <a:ext cx="5486400" cy="3600450"/>
+          </a:xfrm>
+          <a:prstGeom prst="rect">
+            <a:avLst/>
+          </a:prstGeom>
+        </p:spPr>
+        <p:txBody>
+          <a:bodyPr vert="horz" lIns="91440" tIns="45720" rIns="91440" bIns="45720" rtlCol="0"/>
+          <a:lstStyle/>
+          <a:p>
+            <a:pPr lvl="0"/>
+            <a:r>
+              <a:rPr lang="hu-HU"/>
+              <a:t>Mintaszöveg szerkesztése</a:t>
+            </a:r>
+          </a:p>
+          <a:p>
+            <a:pPr lvl="1"/>
+            <a:r>
+              <a:rPr lang="hu-HU"/>
+              <a:t>Második szint</a:t>
+            </a:r>
+          </a:p>
+          <a:p>
+            <a:pPr lvl="2"/>
+            <a:r>
+              <a:rPr lang="hu-HU"/>
+              <a:t>Harmadik szint</a:t>
+            </a:r>
+          </a:p>
+          <a:p>
+            <a:pPr lvl="3"/>
+            <a:r>
+              <a:rPr lang="hu-HU"/>
+              <a:t>Negyedik szint</a:t>
+            </a:r>
+          </a:p>
+          <a:p>
+            <a:pPr lvl="4"/>
+            <a:r>
+              <a:rPr lang="hu-HU"/>
+              <a:t>Ötödik szint</a:t>
+            </a:r>
+          </a:p>
+        </p:txBody>
+      </p:sp>
+      <p:sp>
+        <p:nvSpPr>
+          <p:cNvPr id="6" name="Élőláb helye 5"/>
+          <p:cNvSpPr>
+            <a:spLocks noGrp="1"/>
+          </p:cNvSpPr>
+          <p:nvPr>
+            <p:ph type="ftr" sz="quarter" idx="4"/>
+          </p:nvPr>
+        </p:nvSpPr>
+        <p:spPr>
+          <a:xfrm>
+            <a:off x="0" y="8685213"/>
+            <a:ext cx="2971800" cy="458787"/>
+          </a:xfrm>
+          <a:prstGeom prst="rect">
+            <a:avLst/>
+          </a:prstGeom>
+        </p:spPr>
+        <p:txBody>
+          <a:bodyPr vert="horz" lIns="91440" tIns="45720" rIns="91440" bIns="45720" rtlCol="0" anchor="b"/>
+          <a:lstStyle>
+            <a:lvl1pPr algn="l">
+              <a:defRPr sz="1200"/>
+            </a:lvl1pPr>
+          </a:lstStyle>
+          <a:p>
+            <a:endParaRPr lang="hu-HU"/>
+          </a:p>
+        </p:txBody>
+      </p:sp>
+      <p:sp>
+        <p:nvSpPr>
+          <p:cNvPr id="7" name="Dia számának helye 6"/>
+          <p:cNvSpPr>
+            <a:spLocks noGrp="1"/>
+          </p:cNvSpPr>
+          <p:nvPr>
+            <p:ph type="sldNum" sz="quarter" idx="5"/>
+          </p:nvPr>
+        </p:nvSpPr>
+        <p:spPr>
+          <a:xfrm>
+            <a:off x="3884613" y="8685213"/>
+            <a:ext cx="2971800" cy="458787"/>
+          </a:xfrm>
+          <a:prstGeom prst="rect">
+            <a:avLst/>
+          </a:prstGeom>
+        </p:spPr>
+        <p:txBody>
+          <a:bodyPr vert="horz" lIns="91440" tIns="45720" rIns="91440" bIns="45720" rtlCol="0" anchor="b"/>
+          <a:lstStyle>
+            <a:lvl1pPr algn="r">
+              <a:defRPr sz="1200"/>
+            </a:lvl1pPr>
+          </a:lstStyle>
+          <a:p>
+            <a:fld id="{FCB8E4BA-7CF9-42CE-921E-E34B251F222B}" type="slidenum">
+              <a:rPr lang="hu-HU" smtClean="0"/>
+              <a:t>‹#›</a:t>
+            </a:fld>
+            <a:endParaRPr lang="hu-HU"/>
+          </a:p>
+        </p:txBody>
+      </p:sp>
+    </p:spTree>
+    <p:extLst>
+      <p:ext uri="{BB962C8B-B14F-4D97-AF65-F5344CB8AC3E}">
+        <p14:creationId xmlns:p14="http://schemas.microsoft.com/office/powerpoint/2010/main" val="3685589525"/>
+      </p:ext>
+    </p:extLst>
+  </p:cSld>
+  <p:clrMap bg1="lt1" tx1="dk1" bg2="lt2" tx2="dk2" accent1="accent1" accent2="accent2" accent3="accent3" accent4="accent4" accent5="accent5" accent6="accent6" hlink="hlink" folHlink="folHlink"/>
+  <p:notesStyle>
+    <a:lvl1pPr marL="0" algn="l" defTabSz="914400" rtl="0" eaLnBrk="1" latinLnBrk="0" hangingPunct="1">
+      <a:defRPr sz="1200" kern="1200">
+        <a:solidFill>
+          <a:schemeClr val="tx1"/>
+        </a:solidFill>
+        <a:latin typeface="+mn-lt"/>
+        <a:ea typeface="+mn-ea"/>
+        <a:cs typeface="+mn-cs"/>
+      </a:defRPr>
+    </a:lvl1pPr>
+    <a:lvl2pPr marL="457200" algn="l" defTabSz="914400" rtl="0" eaLnBrk="1" latinLnBrk="0" hangingPunct="1">
+      <a:defRPr sz="1200" kern="1200">
+        <a:solidFill>
+          <a:schemeClr val="tx1"/>
+        </a:solidFill>
+        <a:latin typeface="+mn-lt"/>
+        <a:ea typeface="+mn-ea"/>
+        <a:cs typeface="+mn-cs"/>
+      </a:defRPr>
+    </a:lvl2pPr>
+    <a:lvl3pPr marL="914400" algn="l" defTabSz="914400" rtl="0" eaLnBrk="1" latinLnBrk="0" hangingPunct="1">
+      <a:defRPr sz="1200" kern="1200">
+        <a:solidFill>
+          <a:schemeClr val="tx1"/>
+        </a:solidFill>
+        <a:latin typeface="+mn-lt"/>
+        <a:ea typeface="+mn-ea"/>
+        <a:cs typeface="+mn-cs"/>
+      </a:defRPr>
+    </a:lvl3pPr>
+    <a:lvl4pPr marL="1371600" algn="l" defTabSz="914400" rtl="0" eaLnBrk="1" latinLnBrk="0" hangingPunct="1">
+      <a:defRPr sz="1200" kern="1200">
+        <a:solidFill>
+          <a:schemeClr val="tx1"/>
+        </a:solidFill>
+        <a:latin typeface="+mn-lt"/>
+        <a:ea typeface="+mn-ea"/>
+        <a:cs typeface="+mn-cs"/>
+      </a:defRPr>
+    </a:lvl4pPr>
+    <a:lvl5pPr marL="1828800" algn="l" defTabSz="914400" rtl="0" eaLnBrk="1" latinLnBrk="0" hangingPunct="1">
+      <a:defRPr sz="1200" kern="1200">
+        <a:solidFill>
+          <a:schemeClr val="tx1"/>
+        </a:solidFill>
+        <a:latin typeface="+mn-lt"/>
+        <a:ea typeface="+mn-ea"/>
+        <a:cs typeface="+mn-cs"/>
+      </a:defRPr>
+    </a:lvl5pPr>
+    <a:lvl6pPr marL="2286000" algn="l" defTabSz="914400" rtl="0" eaLnBrk="1" latinLnBrk="0" hangingPunct="1">
+      <a:defRPr sz="1200" kern="1200">
+        <a:solidFill>
+          <a:schemeClr val="tx1"/>
+        </a:solidFill>
+        <a:latin typeface="+mn-lt"/>
+        <a:ea typeface="+mn-ea"/>
+        <a:cs typeface="+mn-cs"/>
+      </a:defRPr>
+    </a:lvl6pPr>
+    <a:lvl7pPr marL="2743200" algn="l" defTabSz="914400" rtl="0" eaLnBrk="1" latinLnBrk="0" hangingPunct="1">
+      <a:defRPr sz="1200" kern="1200">
+        <a:solidFill>
+          <a:schemeClr val="tx1"/>
+        </a:solidFill>
+        <a:latin typeface="+mn-lt"/>
+        <a:ea typeface="+mn-ea"/>
+        <a:cs typeface="+mn-cs"/>
+      </a:defRPr>
+    </a:lvl7pPr>
+    <a:lvl8pPr marL="3200400" algn="l" defTabSz="914400" rtl="0" eaLnBrk="1" latinLnBrk="0" hangingPunct="1">
+      <a:defRPr sz="1200" kern="1200">
+        <a:solidFill>
+          <a:schemeClr val="tx1"/>
+        </a:solidFill>
+        <a:latin typeface="+mn-lt"/>
+        <a:ea typeface="+mn-ea"/>
+        <a:cs typeface="+mn-cs"/>
+      </a:defRPr>
+    </a:lvl8pPr>
+    <a:lvl9pPr marL="3657600" algn="l" defTabSz="914400" rtl="0" eaLnBrk="1" latinLnBrk="0" hangingPunct="1">
+      <a:defRPr sz="1200" kern="1200">
+        <a:solidFill>
+          <a:schemeClr val="tx1"/>
+        </a:solidFill>
+        <a:latin typeface="+mn-lt"/>
+        <a:ea typeface="+mn-ea"/>
+        <a:cs typeface="+mn-cs"/>
+      </a:defRPr>
+    </a:lvl9pPr>
+  </p:notesStyle>
+</p:notesMaster>
+</file>
+
+<file path=ppt/notesSlides/notesSlide1.xml><?xml version="1.0" encoding="utf-8"?>
+<p:notes xmlns:a="http://schemas.openxmlformats.org/drawingml/2006/main" xmlns:r="http://schemas.openxmlformats.org/officeDocument/2006/relationships" xmlns:p="http://schemas.openxmlformats.org/presentationml/2006/main">
+  <p:cSld>
+    <p:spTree>
+      <p:nvGrpSpPr>
+        <p:cNvPr id="1" name=""/>
+        <p:cNvGrpSpPr/>
+        <p:nvPr/>
+      </p:nvGrpSpPr>
+      <p:grpSpPr>
+        <a:xfrm>
+          <a:off x="0" y="0"/>
+          <a:ext cx="0" cy="0"/>
+          <a:chOff x="0" y="0"/>
+          <a:chExt cx="0" cy="0"/>
+        </a:xfrm>
+      </p:grpSpPr>
+      <p:sp>
+        <p:nvSpPr>
+          <p:cNvPr id="2" name="Diakép helye 1"/>
+          <p:cNvSpPr>
+            <a:spLocks noGrp="1" noRot="1" noChangeAspect="1"/>
+          </p:cNvSpPr>
+          <p:nvPr>
+            <p:ph type="sldImg"/>
+          </p:nvPr>
+        </p:nvSpPr>
+        <p:spPr/>
+      </p:sp>
+      <p:sp>
+        <p:nvSpPr>
+          <p:cNvPr id="3" name="Jegyzetek helye 2"/>
+          <p:cNvSpPr>
+            <a:spLocks noGrp="1"/>
+          </p:cNvSpPr>
+          <p:nvPr>
+            <p:ph type="body" idx="1"/>
+          </p:nvPr>
+        </p:nvSpPr>
+        <p:spPr/>
+        <p:txBody>
+          <a:bodyPr/>
+          <a:lstStyle/>
+          <a:p>
+            <a:r>
+              <a:rPr lang="hu-HU" dirty="0"/>
+              <a:t>aszimptotikusan nem javítható: a leírt módszer által elért felső korlát és a bizonyított alsó korlát ugyanabba a nagyságrendbe esik</a:t>
+            </a:r>
+          </a:p>
+          <a:p>
+            <a:r>
+              <a:rPr lang="hu-HU"/>
+              <a:t>a probléma legrosszabb esetben ennyire nehéz, és nincs olyan algoritmus, ami minden esetre lényegesen gyorsabb lehetne</a:t>
+            </a:r>
+            <a:endParaRPr lang="hu-HU" dirty="0"/>
+          </a:p>
+        </p:txBody>
+      </p:sp>
+      <p:sp>
+        <p:nvSpPr>
+          <p:cNvPr id="4" name="Dia számának helye 3"/>
+          <p:cNvSpPr>
+            <a:spLocks noGrp="1"/>
+          </p:cNvSpPr>
+          <p:nvPr>
+            <p:ph type="sldNum" sz="quarter" idx="5"/>
+          </p:nvPr>
+        </p:nvSpPr>
+        <p:spPr/>
+        <p:txBody>
+          <a:bodyPr/>
+          <a:lstStyle/>
+          <a:p>
+            <a:fld id="{FCB8E4BA-7CF9-42CE-921E-E34B251F222B}" type="slidenum">
+              <a:rPr lang="hu-HU" smtClean="0"/>
+              <a:t>27</a:t>
+            </a:fld>
+            <a:endParaRPr lang="hu-HU"/>
+          </a:p>
+        </p:txBody>
+      </p:sp>
+    </p:spTree>
+    <p:extLst>
+      <p:ext uri="{BB962C8B-B14F-4D97-AF65-F5344CB8AC3E}">
+        <p14:creationId xmlns:p14="http://schemas.microsoft.com/office/powerpoint/2010/main" val="1894062575"/>
+      </p:ext>
+    </p:extLst>
+  </p:cSld>
+  <p:clrMapOvr>
+    <a:masterClrMapping/>
+  </p:clrMapOvr>
+</p:notes>
 </file>
 
 <file path=ppt/slideLayouts/slideLayout1.xml><?xml version="1.0" encoding="utf-8"?>
@@ -15777,8 +16228,8 @@
           </a:p>
         </p:txBody>
       </p:sp>
-      <mc:AlternateContent xmlns:mc="http://schemas.openxmlformats.org/markup-compatibility/2006">
-        <mc:Choice xmlns:a14="http://schemas.microsoft.com/office/drawing/2010/main" Requires="a14">
+      <mc:AlternateContent xmlns:mc="http://schemas.openxmlformats.org/markup-compatibility/2006" xmlns:a14="http://schemas.microsoft.com/office/drawing/2010/main">
+        <mc:Choice Requires="a14">
           <p:sp>
             <p:nvSpPr>
               <p:cNvPr id="3" name="Tartalom helye 2">
@@ -15822,7 +16273,9 @@
                 <a14:m>
                   <m:oMath xmlns:m="http://schemas.openxmlformats.org/officeDocument/2006/math">
                     <m:r>
-                      <a:rPr lang="hu-HU" i="1"/>
+                      <a:rPr lang="hu-HU" i="1">
+                        <a:latin typeface="Cambria Math" panose="02040503050406030204" pitchFamily="18" charset="0"/>
+                      </a:rPr>
                       <m:t>𝑆</m:t>
                     </m:r>
                     <m:r>
@@ -15848,15 +16301,21 @@
                 <a14:m>
                   <m:oMath xmlns:m="http://schemas.openxmlformats.org/officeDocument/2006/math">
                     <m:r>
-                      <a:rPr lang="hu-HU" i="1"/>
+                      <a:rPr lang="hu-HU" i="1">
+                        <a:latin typeface="Cambria Math" panose="02040503050406030204" pitchFamily="18" charset="0"/>
+                      </a:rPr>
                       <m:t>𝑆</m:t>
                     </m:r>
                     <m:r>
-                      <a:rPr lang="hu-HU"/>
+                      <a:rPr lang="hu-HU">
+                        <a:latin typeface="Cambria Math" panose="02040503050406030204" pitchFamily="18" charset="0"/>
+                      </a:rPr>
                       <m:t>⊂</m:t>
                     </m:r>
                     <m:r>
-                      <a:rPr lang="hu-HU" i="1"/>
+                      <a:rPr lang="hu-HU" i="1">
+                        <a:latin typeface="Cambria Math" panose="02040503050406030204" pitchFamily="18" charset="0"/>
+                      </a:rPr>
                       <m:t>𝐶</m:t>
                     </m:r>
                   </m:oMath>
@@ -16071,7 +16530,7 @@
             </p:txBody>
           </p:sp>
         </mc:Choice>
-        <mc:Fallback>
+        <mc:Fallback xmlns="">
           <p:sp>
             <p:nvSpPr>
               <p:cNvPr id="3" name="Tartalom helye 2">
@@ -17116,6 +17575,1506 @@
     <p:extLst>
       <p:ext uri="{BB962C8B-B14F-4D97-AF65-F5344CB8AC3E}">
         <p14:creationId xmlns:p14="http://schemas.microsoft.com/office/powerpoint/2010/main" val="233958653"/>
+      </p:ext>
+    </p:extLst>
+  </p:cSld>
+  <p:clrMapOvr>
+    <a:masterClrMapping/>
+  </p:clrMapOvr>
+</p:sld>
+</file>
+
+<file path=ppt/slides/slide23.xml><?xml version="1.0" encoding="utf-8"?>
+<p:sld xmlns:a="http://schemas.openxmlformats.org/drawingml/2006/main" xmlns:r="http://schemas.openxmlformats.org/officeDocument/2006/relationships" xmlns:p="http://schemas.openxmlformats.org/presentationml/2006/main">
+  <p:cSld>
+    <p:spTree>
+      <p:nvGrpSpPr>
+        <p:cNvPr id="1" name=""/>
+        <p:cNvGrpSpPr/>
+        <p:nvPr/>
+      </p:nvGrpSpPr>
+      <p:grpSpPr>
+        <a:xfrm>
+          <a:off x="0" y="0"/>
+          <a:ext cx="0" cy="0"/>
+          <a:chOff x="0" y="0"/>
+          <a:chExt cx="0" cy="0"/>
+        </a:xfrm>
+      </p:grpSpPr>
+      <p:sp>
+        <p:nvSpPr>
+          <p:cNvPr id="2" name="Cím 1">
+            <a:extLst>
+              <a:ext uri="{FF2B5EF4-FFF2-40B4-BE49-F238E27FC236}">
+                <a16:creationId xmlns:a16="http://schemas.microsoft.com/office/drawing/2014/main" id="{671A5A62-FCC0-B048-FF21-8DF709C5DE40}"/>
+              </a:ext>
+            </a:extLst>
+          </p:cNvPr>
+          <p:cNvSpPr>
+            <a:spLocks noGrp="1"/>
+          </p:cNvSpPr>
+          <p:nvPr>
+            <p:ph type="title"/>
+          </p:nvPr>
+        </p:nvSpPr>
+        <p:spPr>
+          <a:xfrm>
+            <a:off x="1154954" y="973668"/>
+            <a:ext cx="9992017" cy="1072846"/>
+          </a:xfrm>
+        </p:spPr>
+        <p:txBody>
+          <a:bodyPr/>
+          <a:lstStyle/>
+          <a:p>
+            <a:r>
+              <a:rPr lang="hu-HU" dirty="0" err="1"/>
+              <a:t>Phase</a:t>
+            </a:r>
+            <a:r>
+              <a:rPr lang="hu-HU" dirty="0"/>
+              <a:t> (IV): </a:t>
+            </a:r>
+            <a:r>
+              <a:rPr lang="hu-HU" dirty="0" err="1"/>
+              <a:t>Histograms</a:t>
+            </a:r>
+            <a:r>
+              <a:rPr lang="hu-HU" dirty="0"/>
+              <a:t> of </a:t>
+            </a:r>
+            <a:r>
+              <a:rPr lang="hu-HU" dirty="0" err="1"/>
+              <a:t>meta-modules</a:t>
+            </a:r>
+            <a:endParaRPr lang="hu-HU" dirty="0"/>
+          </a:p>
+        </p:txBody>
+      </p:sp>
+      <p:sp>
+        <p:nvSpPr>
+          <p:cNvPr id="3" name="Tartalom helye 2">
+            <a:extLst>
+              <a:ext uri="{FF2B5EF4-FFF2-40B4-BE49-F238E27FC236}">
+                <a16:creationId xmlns:a16="http://schemas.microsoft.com/office/drawing/2014/main" id="{003E4B40-CAAE-9758-75E8-7A981C4DA993}"/>
+              </a:ext>
+            </a:extLst>
+          </p:cNvPr>
+          <p:cNvSpPr>
+            <a:spLocks noGrp="1"/>
+          </p:cNvSpPr>
+          <p:nvPr>
+            <p:ph idx="1"/>
+          </p:nvPr>
+        </p:nvSpPr>
+        <p:spPr>
+          <a:xfrm>
+            <a:off x="1154954" y="2603500"/>
+            <a:ext cx="8825659" cy="3873500"/>
+          </a:xfrm>
+        </p:spPr>
+        <p:txBody>
+          <a:bodyPr>
+            <a:normAutofit/>
+          </a:bodyPr>
+          <a:lstStyle/>
+          <a:p>
+            <a:r>
+              <a:rPr lang="hu-HU" dirty="0"/>
+              <a:t>Általános átalakítás két különböző konfiguráció között</a:t>
+            </a:r>
+          </a:p>
+          <a:p>
+            <a:r>
+              <a:rPr lang="hu-HU" dirty="0"/>
+              <a:t>III. fázis végére a modulok szabályos, x-monoton hisztogram alakban állnak</a:t>
+            </a:r>
+          </a:p>
+          <a:p>
+            <a:pPr lvl="1"/>
+            <a:r>
+              <a:rPr lang="hu-HU" sz="1800" dirty="0" err="1"/>
+              <a:t>Meta</a:t>
+            </a:r>
+            <a:r>
+              <a:rPr lang="hu-HU" sz="1800" dirty="0"/>
+              <a:t>-modulok alkotják az oszlopokat</a:t>
+            </a:r>
+          </a:p>
+          <a:p>
+            <a:pPr lvl="1"/>
+            <a:r>
+              <a:rPr lang="hu-HU" sz="1800" dirty="0"/>
+              <a:t>Keleti oldalról „üres”</a:t>
+            </a:r>
+          </a:p>
+          <a:p>
+            <a:pPr lvl="1"/>
+            <a:r>
+              <a:rPr lang="hu-HU" sz="1800" dirty="0"/>
+              <a:t>Szabályos, rácsos struktúra</a:t>
+            </a:r>
+          </a:p>
+          <a:p>
+            <a:r>
+              <a:rPr lang="hu-HU" dirty="0" err="1"/>
+              <a:t>Meta</a:t>
+            </a:r>
+            <a:r>
+              <a:rPr lang="hu-HU" dirty="0"/>
+              <a:t>-modul: </a:t>
+            </a:r>
+          </a:p>
+          <a:p>
+            <a:pPr lvl="1"/>
+            <a:r>
+              <a:rPr lang="hu-HU" sz="1800" dirty="0"/>
+              <a:t>3x3-as vagy O-alakú blokkok</a:t>
+            </a:r>
+          </a:p>
+          <a:p>
+            <a:pPr lvl="1"/>
+            <a:r>
+              <a:rPr lang="hu-HU" sz="1800" dirty="0"/>
+              <a:t>Önmagukban jól mozgathatók és mindig megtartják a </a:t>
+            </a:r>
+            <a:r>
+              <a:rPr lang="hu-HU" sz="1800" dirty="0" err="1"/>
+              <a:t>konnektivitást</a:t>
+            </a:r>
+            <a:endParaRPr lang="hu-HU" sz="1800" dirty="0"/>
+          </a:p>
+          <a:p>
+            <a:pPr lvl="1"/>
+            <a:r>
+              <a:rPr lang="hu-HU" sz="1800" dirty="0"/>
+              <a:t>Blokk szintű kezelés </a:t>
+            </a:r>
+            <a:r>
+              <a:rPr lang="hu-HU" sz="1800" dirty="0">
+                <a:sym typeface="Wingdings" panose="05000000000000000000" pitchFamily="2" charset="2"/>
+              </a:rPr>
+              <a:t> biztosítja a linearitást + gyorsabb</a:t>
+            </a:r>
+            <a:endParaRPr lang="hu-HU" sz="1800" dirty="0"/>
+          </a:p>
+          <a:p>
+            <a:pPr lvl="1"/>
+            <a:endParaRPr lang="hu-HU" dirty="0"/>
+          </a:p>
+          <a:p>
+            <a:endParaRPr lang="hu-HU" dirty="0"/>
+          </a:p>
+        </p:txBody>
+      </p:sp>
+    </p:spTree>
+    <p:extLst>
+      <p:ext uri="{BB962C8B-B14F-4D97-AF65-F5344CB8AC3E}">
+        <p14:creationId xmlns:p14="http://schemas.microsoft.com/office/powerpoint/2010/main" val="155191746"/>
+      </p:ext>
+    </p:extLst>
+  </p:cSld>
+  <p:clrMapOvr>
+    <a:masterClrMapping/>
+  </p:clrMapOvr>
+</p:sld>
+</file>
+
+<file path=ppt/slides/slide24.xml><?xml version="1.0" encoding="utf-8"?>
+<p:sld xmlns:a="http://schemas.openxmlformats.org/drawingml/2006/main" xmlns:r="http://schemas.openxmlformats.org/officeDocument/2006/relationships" xmlns:p="http://schemas.openxmlformats.org/presentationml/2006/main">
+  <p:cSld>
+    <p:spTree>
+      <p:nvGrpSpPr>
+        <p:cNvPr id="1" name=""/>
+        <p:cNvGrpSpPr/>
+        <p:nvPr/>
+      </p:nvGrpSpPr>
+      <p:grpSpPr>
+        <a:xfrm>
+          <a:off x="0" y="0"/>
+          <a:ext cx="0" cy="0"/>
+          <a:chOff x="0" y="0"/>
+          <a:chExt cx="0" cy="0"/>
+        </a:xfrm>
+      </p:grpSpPr>
+      <p:sp>
+        <p:nvSpPr>
+          <p:cNvPr id="2" name="Cím 1">
+            <a:extLst>
+              <a:ext uri="{FF2B5EF4-FFF2-40B4-BE49-F238E27FC236}">
+                <a16:creationId xmlns:a16="http://schemas.microsoft.com/office/drawing/2014/main" id="{84DC7E83-B9AD-320A-BE6F-6383E00D8E5F}"/>
+              </a:ext>
+            </a:extLst>
+          </p:cNvPr>
+          <p:cNvSpPr>
+            <a:spLocks noGrp="1"/>
+          </p:cNvSpPr>
+          <p:nvPr>
+            <p:ph type="title"/>
+          </p:nvPr>
+        </p:nvSpPr>
+        <p:spPr/>
+        <p:txBody>
+          <a:bodyPr/>
+          <a:lstStyle/>
+          <a:p>
+            <a:r>
+              <a:rPr lang="hu-HU" dirty="0"/>
+              <a:t>Fogalmak</a:t>
+            </a:r>
+          </a:p>
+        </p:txBody>
+      </p:sp>
+      <p:sp>
+        <p:nvSpPr>
+          <p:cNvPr id="3" name="Tartalom helye 2">
+            <a:extLst>
+              <a:ext uri="{FF2B5EF4-FFF2-40B4-BE49-F238E27FC236}">
+                <a16:creationId xmlns:a16="http://schemas.microsoft.com/office/drawing/2014/main" id="{AE26AD90-E2BF-59B0-AF7B-1B32930A4CB2}"/>
+              </a:ext>
+            </a:extLst>
+          </p:cNvPr>
+          <p:cNvSpPr>
+            <a:spLocks noGrp="1"/>
+          </p:cNvSpPr>
+          <p:nvPr>
+            <p:ph idx="1"/>
+          </p:nvPr>
+        </p:nvSpPr>
+        <p:spPr>
+          <a:xfrm>
+            <a:off x="1154954" y="2603500"/>
+            <a:ext cx="8825659" cy="3568700"/>
+          </a:xfrm>
+        </p:spPr>
+        <p:txBody>
+          <a:bodyPr>
+            <a:normAutofit lnSpcReduction="10000"/>
+          </a:bodyPr>
+          <a:lstStyle/>
+          <a:p>
+            <a:r>
+              <a:rPr lang="hu-HU" b="1" dirty="0"/>
+              <a:t>Skálázott konfiguráció (</a:t>
+            </a:r>
+            <a:r>
+              <a:rPr lang="hu-HU" b="1" dirty="0" err="1"/>
+              <a:t>Scale</a:t>
+            </a:r>
+            <a:r>
+              <a:rPr lang="hu-HU" b="1" dirty="0"/>
+              <a:t>):</a:t>
+            </a:r>
+          </a:p>
+          <a:p>
+            <a:pPr lvl="1"/>
+            <a:r>
+              <a:rPr lang="hu-HU" sz="1800" dirty="0" err="1"/>
+              <a:t>Meta</a:t>
+            </a:r>
+            <a:r>
+              <a:rPr lang="hu-HU" sz="1800" dirty="0"/>
+              <a:t>-modulok építik fel, amik </a:t>
+            </a:r>
+            <a:r>
+              <a:rPr lang="hu-HU" sz="1800" dirty="0" err="1"/>
+              <a:t>diszjunktak</a:t>
+            </a:r>
+            <a:r>
+              <a:rPr lang="hu-HU" sz="1800" dirty="0"/>
+              <a:t> (nem fedik egymást)</a:t>
+            </a:r>
+          </a:p>
+          <a:p>
+            <a:pPr lvl="1"/>
+            <a:r>
+              <a:rPr lang="hu-HU" sz="1800" dirty="0"/>
+              <a:t>Minden </a:t>
+            </a:r>
+            <a:r>
+              <a:rPr lang="hu-HU" sz="1800" dirty="0" err="1"/>
+              <a:t>meta</a:t>
+            </a:r>
+            <a:r>
+              <a:rPr lang="hu-HU" sz="1800" dirty="0"/>
+              <a:t>-modul középpontja illeszkedik egy 3x3-as rácsra</a:t>
+            </a:r>
+          </a:p>
+          <a:p>
+            <a:pPr lvl="1"/>
+            <a:r>
+              <a:rPr lang="hu-HU" sz="1800" dirty="0"/>
+              <a:t>Összes </a:t>
+            </a:r>
+            <a:r>
+              <a:rPr lang="hu-HU" sz="1800" dirty="0" err="1"/>
+              <a:t>meta</a:t>
+            </a:r>
+            <a:r>
+              <a:rPr lang="hu-HU" sz="1800" dirty="0"/>
+              <a:t>-modul középpontja ugyanarra a rácsra esik</a:t>
+            </a:r>
+          </a:p>
+          <a:p>
+            <a:r>
+              <a:rPr lang="hu-HU" b="1" dirty="0"/>
+              <a:t>Hisztogram konfiguráció:</a:t>
+            </a:r>
+          </a:p>
+          <a:p>
+            <a:pPr lvl="1"/>
+            <a:r>
+              <a:rPr lang="hu-HU" sz="1800" dirty="0"/>
+              <a:t>Van egy alap (</a:t>
+            </a:r>
+            <a:r>
+              <a:rPr lang="hu-HU" sz="1800" i="1" dirty="0" err="1"/>
+              <a:t>base</a:t>
+            </a:r>
+            <a:r>
+              <a:rPr lang="hu-HU" sz="1800" dirty="0"/>
+              <a:t>), ami egy egyenes sor modul (pl. vízszintesen végig)</a:t>
+            </a:r>
+          </a:p>
+          <a:p>
+            <a:pPr lvl="1"/>
+            <a:r>
+              <a:rPr lang="hu-HU" sz="1800" dirty="0"/>
+              <a:t>Ehhez az alaphoz merőlegesen kapcsolódnak oszlopok (</a:t>
+            </a:r>
+            <a:r>
+              <a:rPr lang="hu-HU" sz="1800" i="1" dirty="0"/>
+              <a:t>bars</a:t>
+            </a:r>
+            <a:r>
+              <a:rPr lang="hu-HU" sz="1800" dirty="0"/>
+              <a:t>), vagyis egyenes modul-sorok, amelyek az alapból "felfelé" vagy "lefelé" indulnak.</a:t>
+            </a:r>
+          </a:p>
+          <a:p>
+            <a:pPr lvl="1"/>
+            <a:endParaRPr lang="hu-HU" dirty="0"/>
+          </a:p>
+        </p:txBody>
+      </p:sp>
+    </p:spTree>
+    <p:extLst>
+      <p:ext uri="{BB962C8B-B14F-4D97-AF65-F5344CB8AC3E}">
+        <p14:creationId xmlns:p14="http://schemas.microsoft.com/office/powerpoint/2010/main" val="1196778124"/>
+      </p:ext>
+    </p:extLst>
+  </p:cSld>
+  <p:clrMapOvr>
+    <a:masterClrMapping/>
+  </p:clrMapOvr>
+</p:sld>
+</file>
+
+<file path=ppt/slides/slide25.xml><?xml version="1.0" encoding="utf-8"?>
+<p:sld xmlns:a="http://schemas.openxmlformats.org/drawingml/2006/main" xmlns:r="http://schemas.openxmlformats.org/officeDocument/2006/relationships" xmlns:p="http://schemas.openxmlformats.org/presentationml/2006/main">
+  <p:cSld>
+    <p:bg>
+      <p:bgPr>
+        <a:solidFill>
+          <a:schemeClr val="bg1"/>
+        </a:solidFill>
+        <a:effectLst/>
+      </p:bgPr>
+    </p:bg>
+    <p:spTree>
+      <p:nvGrpSpPr>
+        <p:cNvPr id="1" name=""/>
+        <p:cNvGrpSpPr/>
+        <p:nvPr/>
+      </p:nvGrpSpPr>
+      <p:grpSpPr>
+        <a:xfrm>
+          <a:off x="0" y="0"/>
+          <a:ext cx="0" cy="0"/>
+          <a:chOff x="0" y="0"/>
+          <a:chExt cx="0" cy="0"/>
+        </a:xfrm>
+      </p:grpSpPr>
+      <p:sp>
+        <p:nvSpPr>
+          <p:cNvPr id="10" name="Rectangle 9">
+            <a:extLst>
+              <a:ext uri="{FF2B5EF4-FFF2-40B4-BE49-F238E27FC236}">
+                <a16:creationId xmlns:a16="http://schemas.microsoft.com/office/drawing/2014/main" id="{0D105174-071A-4257-860A-5EE2D11DD5E6}"/>
+              </a:ext>
+              <a:ext uri="{C183D7F6-B498-43B3-948B-1728B52AA6E4}">
+                <adec:decorative xmlns:adec="http://schemas.microsoft.com/office/drawing/2017/decorative" val="1"/>
+              </a:ext>
+            </a:extLst>
+          </p:cNvPr>
+          <p:cNvSpPr>
+            <a:spLocks noGrp="1" noRot="1" noChangeAspect="1" noMove="1" noResize="1" noEditPoints="1" noAdjustHandles="1" noChangeArrowheads="1" noChangeShapeType="1" noTextEdit="1"/>
+          </p:cNvSpPr>
+          <p:nvPr>
+            <p:extLst>
+              <p:ext uri="{386F3935-93C4-4BCD-93E2-E3B085C9AB24}">
+                <p16:designElem xmlns:p16="http://schemas.microsoft.com/office/powerpoint/2015/main" val="1"/>
+              </p:ext>
+            </p:extLst>
+          </p:nvPr>
+        </p:nvSpPr>
+        <p:spPr>
+          <a:xfrm>
+            <a:off x="0" y="0"/>
+            <a:ext cx="12192000" cy="6858000"/>
+          </a:xfrm>
+          <a:prstGeom prst="rect">
+            <a:avLst/>
+          </a:prstGeom>
+          <a:ln>
+            <a:noFill/>
+          </a:ln>
+        </p:spPr>
+        <p:style>
+          <a:lnRef idx="2">
+            <a:schemeClr val="accent1">
+              <a:shade val="50000"/>
+            </a:schemeClr>
+          </a:lnRef>
+          <a:fillRef idx="1003">
+            <a:schemeClr val="dk2"/>
+          </a:fillRef>
+          <a:effectRef idx="0">
+            <a:schemeClr val="accent1"/>
+          </a:effectRef>
+          <a:fontRef idx="minor">
+            <a:schemeClr val="lt1"/>
+          </a:fontRef>
+        </p:style>
+        <p:txBody>
+          <a:bodyPr/>
+          <a:lstStyle/>
+          <a:p>
+            <a:endParaRPr lang="hu-HU"/>
+          </a:p>
+        </p:txBody>
+      </p:sp>
+      <p:sp>
+        <p:nvSpPr>
+          <p:cNvPr id="12" name="Freeform 5">
+            <a:extLst>
+              <a:ext uri="{FF2B5EF4-FFF2-40B4-BE49-F238E27FC236}">
+                <a16:creationId xmlns:a16="http://schemas.microsoft.com/office/drawing/2014/main" id="{E17B217C-3C66-46B3-9E9D-2771AA2A23E2}"/>
+              </a:ext>
+              <a:ext uri="{C183D7F6-B498-43B3-948B-1728B52AA6E4}">
+                <adec:decorative xmlns:adec="http://schemas.microsoft.com/office/drawing/2017/decorative" val="1"/>
+              </a:ext>
+            </a:extLst>
+          </p:cNvPr>
+          <p:cNvSpPr>
+            <a:spLocks noGrp="1" noRot="1" noChangeAspect="1" noMove="1" noResize="1" noEditPoints="1" noAdjustHandles="1" noChangeArrowheads="1" noChangeShapeType="1" noTextEdit="1"/>
+          </p:cNvSpPr>
+          <p:nvPr>
+            <p:extLst>
+              <p:ext uri="{386F3935-93C4-4BCD-93E2-E3B085C9AB24}">
+                <p16:designElem xmlns:p16="http://schemas.microsoft.com/office/powerpoint/2015/main" val="1"/>
+              </p:ext>
+            </p:extLst>
+          </p:nvPr>
+        </p:nvSpPr>
+        <p:spPr bwMode="gray">
+          <a:xfrm>
+            <a:off x="0" y="1587"/>
+            <a:ext cx="12192000" cy="6856413"/>
+          </a:xfrm>
+          <a:custGeom>
+            <a:avLst/>
+            <a:gdLst/>
+            <a:ahLst/>
+            <a:cxnLst/>
+            <a:rect l="0" t="0" r="r" b="b"/>
+            <a:pathLst>
+              <a:path w="15356" h="8638">
+                <a:moveTo>
+                  <a:pt x="0" y="0"/>
+                </a:moveTo>
+                <a:lnTo>
+                  <a:pt x="0" y="8638"/>
+                </a:lnTo>
+                <a:lnTo>
+                  <a:pt x="15356" y="8638"/>
+                </a:lnTo>
+                <a:lnTo>
+                  <a:pt x="15356" y="0"/>
+                </a:lnTo>
+                <a:lnTo>
+                  <a:pt x="0" y="0"/>
+                </a:lnTo>
+                <a:close/>
+                <a:moveTo>
+                  <a:pt x="14748" y="8038"/>
+                </a:moveTo>
+                <a:lnTo>
+                  <a:pt x="600" y="8038"/>
+                </a:lnTo>
+                <a:lnTo>
+                  <a:pt x="600" y="592"/>
+                </a:lnTo>
+                <a:lnTo>
+                  <a:pt x="14748" y="592"/>
+                </a:lnTo>
+                <a:lnTo>
+                  <a:pt x="14748" y="8038"/>
+                </a:lnTo>
+                <a:close/>
+              </a:path>
+            </a:pathLst>
+          </a:custGeom>
+          <a:solidFill>
+            <a:schemeClr val="tx1"/>
+          </a:solidFill>
+          <a:ln>
+            <a:noFill/>
+          </a:ln>
+        </p:spPr>
+        <p:txBody>
+          <a:bodyPr/>
+          <a:lstStyle/>
+          <a:p>
+            <a:endParaRPr lang="hu-HU"/>
+          </a:p>
+        </p:txBody>
+      </p:sp>
+      <p:sp>
+        <p:nvSpPr>
+          <p:cNvPr id="2" name="Cím 1">
+            <a:extLst>
+              <a:ext uri="{FF2B5EF4-FFF2-40B4-BE49-F238E27FC236}">
+                <a16:creationId xmlns:a16="http://schemas.microsoft.com/office/drawing/2014/main" id="{E05A4CA0-1859-900C-A200-7E406B229D9B}"/>
+              </a:ext>
+            </a:extLst>
+          </p:cNvPr>
+          <p:cNvSpPr>
+            <a:spLocks noGrp="1"/>
+          </p:cNvSpPr>
+          <p:nvPr>
+            <p:ph type="title"/>
+          </p:nvPr>
+        </p:nvSpPr>
+        <p:spPr>
+          <a:xfrm>
+            <a:off x="639098" y="629265"/>
+            <a:ext cx="3421623" cy="5601210"/>
+          </a:xfrm>
+        </p:spPr>
+        <p:txBody>
+          <a:bodyPr>
+            <a:normAutofit/>
+          </a:bodyPr>
+          <a:lstStyle/>
+          <a:p>
+            <a:r>
+              <a:rPr lang="hu-HU" sz="4000" dirty="0" err="1">
+                <a:solidFill>
+                  <a:srgbClr val="EBEBEB"/>
+                </a:solidFill>
+              </a:rPr>
+              <a:t>Histogram</a:t>
+            </a:r>
+            <a:r>
+              <a:rPr lang="hu-HU" sz="4000" dirty="0">
+                <a:solidFill>
+                  <a:srgbClr val="EBEBEB"/>
+                </a:solidFill>
+              </a:rPr>
+              <a:t> → xy-monoton </a:t>
+            </a:r>
+            <a:r>
+              <a:rPr lang="hu-HU" sz="4000" dirty="0" err="1">
+                <a:solidFill>
+                  <a:srgbClr val="EBEBEB"/>
+                </a:solidFill>
+              </a:rPr>
+              <a:t>histogram</a:t>
+            </a:r>
+            <a:endParaRPr lang="hu-HU" sz="4000" dirty="0">
+              <a:solidFill>
+                <a:srgbClr val="EBEBEB"/>
+              </a:solidFill>
+            </a:endParaRPr>
+          </a:p>
+        </p:txBody>
+      </p:sp>
+      <p:sp>
+        <p:nvSpPr>
+          <p:cNvPr id="14" name="Rectangle 13">
+            <a:extLst>
+              <a:ext uri="{FF2B5EF4-FFF2-40B4-BE49-F238E27FC236}">
+                <a16:creationId xmlns:a16="http://schemas.microsoft.com/office/drawing/2014/main" id="{8A848D99-5D8B-49F5-97E9-AA7C3F5F2BE6}"/>
+              </a:ext>
+              <a:ext uri="{C183D7F6-B498-43B3-948B-1728B52AA6E4}">
+                <adec:decorative xmlns:adec="http://schemas.microsoft.com/office/drawing/2017/decorative" val="1"/>
+              </a:ext>
+            </a:extLst>
+          </p:cNvPr>
+          <p:cNvSpPr>
+            <a:spLocks noGrp="1" noRot="1" noChangeAspect="1" noMove="1" noResize="1" noEditPoints="1" noAdjustHandles="1" noChangeArrowheads="1" noChangeShapeType="1" noTextEdit="1"/>
+          </p:cNvSpPr>
+          <p:nvPr>
+            <p:extLst>
+              <p:ext uri="{386F3935-93C4-4BCD-93E2-E3B085C9AB24}">
+                <p16:designElem xmlns:p16="http://schemas.microsoft.com/office/powerpoint/2015/main" val="1"/>
+              </p:ext>
+            </p:extLst>
+          </p:nvPr>
+        </p:nvSpPr>
+        <p:spPr>
+          <a:xfrm>
+            <a:off x="10437812" y="0"/>
+            <a:ext cx="685800" cy="1143000"/>
+          </a:xfrm>
+          <a:prstGeom prst="rect">
+            <a:avLst/>
+          </a:prstGeom>
+          <a:solidFill>
+            <a:schemeClr val="accent1"/>
+          </a:solidFill>
+          <a:ln>
+            <a:noFill/>
+          </a:ln>
+        </p:spPr>
+        <p:style>
+          <a:lnRef idx="1">
+            <a:schemeClr val="accent1"/>
+          </a:lnRef>
+          <a:fillRef idx="3">
+            <a:schemeClr val="accent1"/>
+          </a:fillRef>
+          <a:effectRef idx="2">
+            <a:schemeClr val="accent1"/>
+          </a:effectRef>
+          <a:fontRef idx="minor">
+            <a:schemeClr val="lt1"/>
+          </a:fontRef>
+        </p:style>
+        <p:txBody>
+          <a:bodyPr/>
+          <a:lstStyle/>
+          <a:p>
+            <a:endParaRPr lang="hu-HU"/>
+          </a:p>
+        </p:txBody>
+      </p:sp>
+      <p:sp>
+        <p:nvSpPr>
+          <p:cNvPr id="3" name="Tartalom helye 2">
+            <a:extLst>
+              <a:ext uri="{FF2B5EF4-FFF2-40B4-BE49-F238E27FC236}">
+                <a16:creationId xmlns:a16="http://schemas.microsoft.com/office/drawing/2014/main" id="{4640D59E-D15B-80BC-7FBC-904F6AC864B4}"/>
+              </a:ext>
+            </a:extLst>
+          </p:cNvPr>
+          <p:cNvSpPr>
+            <a:spLocks noGrp="1"/>
+          </p:cNvSpPr>
+          <p:nvPr>
+            <p:ph idx="1"/>
+          </p:nvPr>
+        </p:nvSpPr>
+        <p:spPr>
+          <a:xfrm>
+            <a:off x="4719483" y="629265"/>
+            <a:ext cx="6813755" cy="3811740"/>
+          </a:xfrm>
+        </p:spPr>
+        <p:txBody>
+          <a:bodyPr anchor="ctr">
+            <a:normAutofit/>
+          </a:bodyPr>
+          <a:lstStyle/>
+          <a:p>
+            <a:r>
+              <a:rPr lang="hu-HU" dirty="0" err="1">
+                <a:solidFill>
+                  <a:srgbClr val="FFFFFF"/>
+                </a:solidFill>
+              </a:rPr>
+              <a:t>Histogram</a:t>
+            </a:r>
+            <a:r>
+              <a:rPr lang="hu-HU" dirty="0">
+                <a:solidFill>
+                  <a:srgbClr val="FFFFFF"/>
+                </a:solidFill>
+              </a:rPr>
+              <a:t>: alapvonalból és merőleges rudakból áll</a:t>
+            </a:r>
+          </a:p>
+          <a:p>
+            <a:r>
+              <a:rPr lang="hu-HU" dirty="0">
+                <a:solidFill>
+                  <a:srgbClr val="FFFFFF"/>
+                </a:solidFill>
+              </a:rPr>
+              <a:t>XY-</a:t>
+            </a:r>
+            <a:r>
+              <a:rPr lang="hu-HU" dirty="0" err="1">
+                <a:solidFill>
+                  <a:srgbClr val="FFFFFF"/>
+                </a:solidFill>
+              </a:rPr>
+              <a:t>mondoton</a:t>
+            </a:r>
+            <a:r>
+              <a:rPr lang="hu-HU" dirty="0">
+                <a:solidFill>
+                  <a:srgbClr val="FFFFFF"/>
+                </a:solidFill>
+              </a:rPr>
+              <a:t> hisztogram: két hisztogram találkozik egy közös sarokpontban</a:t>
+            </a:r>
+          </a:p>
+          <a:p>
+            <a:r>
+              <a:rPr lang="hu-HU" dirty="0">
+                <a:solidFill>
+                  <a:srgbClr val="FFFFFF"/>
+                </a:solidFill>
+              </a:rPr>
+              <a:t>Algoritmus biztosítja hogy a </a:t>
+            </a:r>
+            <a:r>
+              <a:rPr lang="hu-HU" dirty="0" err="1">
+                <a:solidFill>
+                  <a:srgbClr val="FFFFFF"/>
+                </a:solidFill>
+              </a:rPr>
+              <a:t>sweep</a:t>
+            </a:r>
+            <a:r>
+              <a:rPr lang="hu-HU" dirty="0">
+                <a:solidFill>
+                  <a:srgbClr val="FFFFFF"/>
+                </a:solidFill>
+              </a:rPr>
+              <a:t> után kapott </a:t>
+            </a:r>
+            <a:r>
+              <a:rPr lang="hu-HU" dirty="0" err="1">
+                <a:solidFill>
+                  <a:srgbClr val="FFFFFF"/>
+                </a:solidFill>
+              </a:rPr>
+              <a:t>hisztogrammot</a:t>
+            </a:r>
+            <a:r>
+              <a:rPr lang="hu-HU" dirty="0">
+                <a:solidFill>
+                  <a:srgbClr val="FFFFFF"/>
+                </a:solidFill>
+              </a:rPr>
+              <a:t> skálázza </a:t>
+            </a:r>
+            <a:r>
+              <a:rPr lang="hu-HU" dirty="0" err="1">
+                <a:solidFill>
+                  <a:srgbClr val="FFFFFF"/>
+                </a:solidFill>
+              </a:rPr>
+              <a:t>meta</a:t>
+            </a:r>
+            <a:r>
+              <a:rPr lang="hu-HU" dirty="0">
+                <a:solidFill>
+                  <a:srgbClr val="FFFFFF"/>
+                </a:solidFill>
+              </a:rPr>
+              <a:t>-modulokra (mindig 3-al osztható koordinátákhoz illesztve)</a:t>
+            </a:r>
+          </a:p>
+          <a:p>
+            <a:r>
+              <a:rPr lang="hu-HU" dirty="0">
+                <a:solidFill>
+                  <a:srgbClr val="FFFFFF"/>
+                </a:solidFill>
+              </a:rPr>
+              <a:t>Bármely két xy-monoton hisztogram összeköthető</a:t>
+            </a:r>
+          </a:p>
+          <a:p>
+            <a:pPr lvl="1"/>
+            <a:r>
+              <a:rPr lang="hu-HU" sz="1800" dirty="0">
+                <a:solidFill>
+                  <a:srgbClr val="FFFFFF"/>
+                </a:solidFill>
+              </a:rPr>
+              <a:t>Lineáris számú lépéssel lehet mozogni a kettő között</a:t>
+            </a:r>
+          </a:p>
+          <a:p>
+            <a:pPr lvl="1"/>
+            <a:r>
+              <a:rPr lang="hu-HU" sz="1800" dirty="0">
+                <a:solidFill>
+                  <a:srgbClr val="FFFFFF"/>
+                </a:solidFill>
+              </a:rPr>
+              <a:t>a modulok sosem lépik túl az eredeti két konfiguráció határoló dobozainak unióját</a:t>
+            </a:r>
+          </a:p>
+        </p:txBody>
+      </p:sp>
+      <p:pic>
+        <p:nvPicPr>
+          <p:cNvPr id="5" name="Kép 4" descr="A képen képernyőkép, sor, tér, Téglalap látható&#10;&#10;Előfordulhat, hogy az AI által létrehozott tartalom helytelen.">
+            <a:extLst>
+              <a:ext uri="{FF2B5EF4-FFF2-40B4-BE49-F238E27FC236}">
+                <a16:creationId xmlns:a16="http://schemas.microsoft.com/office/drawing/2014/main" id="{F6BE3651-7699-B7CA-F58B-5AFDD3D40401}"/>
+              </a:ext>
+            </a:extLst>
+          </p:cNvPr>
+          <p:cNvPicPr>
+            <a:picLocks noChangeAspect="1"/>
+          </p:cNvPicPr>
+          <p:nvPr/>
+        </p:nvPicPr>
+        <p:blipFill>
+          <a:blip r:embed="rId2"/>
+          <a:stretch>
+            <a:fillRect/>
+          </a:stretch>
+        </p:blipFill>
+        <p:spPr>
+          <a:xfrm>
+            <a:off x="4719485" y="4582036"/>
+            <a:ext cx="6813754" cy="1618737"/>
+          </a:xfrm>
+          <a:prstGeom prst="roundRect">
+            <a:avLst>
+              <a:gd name="adj" fmla="val 1858"/>
+            </a:avLst>
+          </a:prstGeom>
+          <a:effectLst>
+            <a:outerShdw blurRad="50800" dist="50800" dir="5400000" algn="tl" rotWithShape="0">
+              <a:srgbClr val="000000">
+                <a:alpha val="43000"/>
+              </a:srgbClr>
+            </a:outerShdw>
+          </a:effectLst>
+        </p:spPr>
+      </p:pic>
+    </p:spTree>
+    <p:extLst>
+      <p:ext uri="{BB962C8B-B14F-4D97-AF65-F5344CB8AC3E}">
+        <p14:creationId xmlns:p14="http://schemas.microsoft.com/office/powerpoint/2010/main" val="2549007266"/>
+      </p:ext>
+    </p:extLst>
+  </p:cSld>
+  <p:clrMapOvr>
+    <a:overrideClrMapping bg1="dk1" tx1="lt1" bg2="dk2" tx2="lt2" accent1="accent1" accent2="accent2" accent3="accent3" accent4="accent4" accent5="accent5" accent6="accent6" hlink="hlink" folHlink="folHlink"/>
+  </p:clrMapOvr>
+</p:sld>
+</file>
+
+<file path=ppt/slides/slide26.xml><?xml version="1.0" encoding="utf-8"?>
+<p:sld xmlns:a="http://schemas.openxmlformats.org/drawingml/2006/main" xmlns:r="http://schemas.openxmlformats.org/officeDocument/2006/relationships" xmlns:p="http://schemas.openxmlformats.org/presentationml/2006/main">
+  <p:cSld>
+    <p:spTree>
+      <p:nvGrpSpPr>
+        <p:cNvPr id="1" name=""/>
+        <p:cNvGrpSpPr/>
+        <p:nvPr/>
+      </p:nvGrpSpPr>
+      <p:grpSpPr>
+        <a:xfrm>
+          <a:off x="0" y="0"/>
+          <a:ext cx="0" cy="0"/>
+          <a:chOff x="0" y="0"/>
+          <a:chExt cx="0" cy="0"/>
+        </a:xfrm>
+      </p:grpSpPr>
+      <p:sp>
+        <p:nvSpPr>
+          <p:cNvPr id="2" name="Cím 1">
+            <a:extLst>
+              <a:ext uri="{FF2B5EF4-FFF2-40B4-BE49-F238E27FC236}">
+                <a16:creationId xmlns:a16="http://schemas.microsoft.com/office/drawing/2014/main" id="{8EE402C8-A27B-0E25-C0DA-82AA476D338E}"/>
+              </a:ext>
+            </a:extLst>
+          </p:cNvPr>
+          <p:cNvSpPr>
+            <a:spLocks noGrp="1"/>
+          </p:cNvSpPr>
+          <p:nvPr>
+            <p:ph type="title"/>
+          </p:nvPr>
+        </p:nvSpPr>
+        <p:spPr/>
+        <p:txBody>
+          <a:bodyPr/>
+          <a:lstStyle/>
+          <a:p>
+            <a:r>
+              <a:rPr lang="hu-HU" dirty="0"/>
+              <a:t>Az algoritmus utolsó fázisa</a:t>
+            </a:r>
+          </a:p>
+        </p:txBody>
+      </p:sp>
+      <mc:AlternateContent xmlns:mc="http://schemas.openxmlformats.org/markup-compatibility/2006">
+        <mc:Choice xmlns:a14="http://schemas.microsoft.com/office/drawing/2010/main" Requires="a14">
+          <p:sp>
+            <p:nvSpPr>
+              <p:cNvPr id="3" name="Tartalom helye 2">
+                <a:extLst>
+                  <a:ext uri="{FF2B5EF4-FFF2-40B4-BE49-F238E27FC236}">
+                    <a16:creationId xmlns:a16="http://schemas.microsoft.com/office/drawing/2014/main" id="{514A56C7-0C0C-EE97-D6DF-824095D16113}"/>
+                  </a:ext>
+                </a:extLst>
+              </p:cNvPr>
+              <p:cNvSpPr>
+                <a:spLocks noGrp="1"/>
+              </p:cNvSpPr>
+              <p:nvPr>
+                <p:ph idx="1"/>
+              </p:nvPr>
+            </p:nvSpPr>
+            <p:spPr>
+              <a:xfrm>
+                <a:off x="1219200" y="2364014"/>
+                <a:ext cx="8825659" cy="4178300"/>
+              </a:xfrm>
+            </p:spPr>
+            <p:txBody>
+              <a:bodyPr>
+                <a:noAutofit/>
+              </a:bodyPr>
+              <a:lstStyle/>
+              <a:p>
+                <a:r>
+                  <a:rPr lang="hu-HU" dirty="0"/>
+                  <a:t>A </a:t>
+                </a:r>
+                <a:r>
+                  <a:rPr lang="hu-HU" b="1" dirty="0"/>
+                  <a:t>teljes algoritmus komplexitása </a:t>
+                </a:r>
+                <a14:m>
+                  <m:oMath xmlns:m="http://schemas.openxmlformats.org/officeDocument/2006/math">
+                    <m:r>
+                      <a:rPr lang="hu-HU" b="1" i="1"/>
+                      <m:t>𝑶</m:t>
+                    </m:r>
+                    <m:d>
+                      <m:dPr>
+                        <m:ctrlPr>
+                          <a:rPr lang="ar-AE" b="1" i="1"/>
+                        </m:ctrlPr>
+                      </m:dPr>
+                      <m:e>
+                        <m:sSub>
+                          <m:sSubPr>
+                            <m:ctrlPr>
+                              <a:rPr lang="ar-AE" b="1" i="1"/>
+                            </m:ctrlPr>
+                          </m:sSubPr>
+                          <m:e>
+                            <m:r>
+                              <a:rPr lang="ar-AE" b="1" i="1"/>
+                              <m:t>𝑷</m:t>
+                            </m:r>
+                          </m:e>
+                          <m:sub>
+                            <m:r>
+                              <a:rPr lang="ar-AE" b="1" i="1"/>
+                              <m:t>𝟏</m:t>
+                            </m:r>
+                          </m:sub>
+                        </m:sSub>
+                        <m:r>
+                          <a:rPr lang="ar-AE" b="1"/>
+                          <m:t>+</m:t>
+                        </m:r>
+                        <m:sSub>
+                          <m:sSubPr>
+                            <m:ctrlPr>
+                              <a:rPr lang="ar-AE" b="1" i="1"/>
+                            </m:ctrlPr>
+                          </m:sSubPr>
+                          <m:e>
+                            <m:r>
+                              <a:rPr lang="ar-AE" b="1" i="1"/>
+                              <m:t>𝑷</m:t>
+                            </m:r>
+                          </m:e>
+                          <m:sub>
+                            <m:r>
+                              <a:rPr lang="ar-AE" b="1" i="1"/>
+                              <m:t>𝟐</m:t>
+                            </m:r>
+                          </m:sub>
+                        </m:sSub>
+                      </m:e>
+                    </m:d>
+                  </m:oMath>
+                </a14:m>
+                <a:r>
+                  <a:rPr lang="ar-AE" dirty="0"/>
+                  <a:t>, </a:t>
+                </a:r>
+                <a:r>
+                  <a:rPr lang="hu-HU" dirty="0"/>
+                  <a:t>ahol </a:t>
+                </a:r>
+                <a14:m>
+                  <m:oMath xmlns:m="http://schemas.openxmlformats.org/officeDocument/2006/math">
+                    <m:sSub>
+                      <m:sSubPr>
+                        <m:ctrlPr>
+                          <a:rPr lang="ar-AE"/>
+                        </m:ctrlPr>
+                      </m:sSubPr>
+                      <m:e>
+                        <m:r>
+                          <a:rPr lang="ar-AE" i="1"/>
+                          <m:t>𝑃</m:t>
+                        </m:r>
+                      </m:e>
+                      <m:sub>
+                        <m:r>
+                          <a:rPr lang="ar-AE"/>
+                          <m:t>1</m:t>
+                        </m:r>
+                      </m:sub>
+                    </m:sSub>
+                    <m:r>
+                      <a:rPr lang="ar-AE"/>
+                      <m:t>,</m:t>
+                    </m:r>
+                    <m:sSub>
+                      <m:sSubPr>
+                        <m:ctrlPr>
+                          <a:rPr lang="ar-AE" i="1"/>
+                        </m:ctrlPr>
+                      </m:sSubPr>
+                      <m:e>
+                        <m:r>
+                          <a:rPr lang="ar-AE" i="1"/>
+                          <m:t>𝑃</m:t>
+                        </m:r>
+                      </m:e>
+                      <m:sub>
+                        <m:r>
+                          <a:rPr lang="ar-AE"/>
+                          <m:t>2</m:t>
+                        </m:r>
+                      </m:sub>
+                    </m:sSub>
+                  </m:oMath>
+                </a14:m>
+                <a:r>
+                  <a:rPr lang="hu-HU" dirty="0"/>
+                  <a:t>a két konfiguráció kerületének hossza</a:t>
+                </a:r>
+              </a:p>
+              <a:p>
+                <a:r>
+                  <a:rPr lang="hu-HU" dirty="0"/>
+                  <a:t>A IV. fázis lényege:</a:t>
+                </a:r>
+              </a:p>
+              <a:p>
+                <a:pPr lvl="1" defTabSz="914400" eaLnBrk="0" fontAlgn="base" hangingPunct="0">
+                  <a:lnSpc>
+                    <a:spcPct val="150000"/>
+                  </a:lnSpc>
+                  <a:spcBef>
+                    <a:spcPct val="0"/>
+                  </a:spcBef>
+                  <a:spcAft>
+                    <a:spcPct val="0"/>
+                  </a:spcAft>
+                  <a:buClr>
+                    <a:schemeClr val="accent2">
+                      <a:lumMod val="40000"/>
+                      <a:lumOff val="60000"/>
+                    </a:schemeClr>
+                  </a:buClr>
+                  <a:buSzPct val="90000"/>
+                </a:pPr>
+                <a:r>
+                  <a:rPr lang="hu-HU" altLang="hu-HU" sz="1800" b="1" i="1" dirty="0"/>
+                  <a:t>Standardizálás</a:t>
+                </a:r>
+                <a:r>
+                  <a:rPr lang="hu-HU" altLang="hu-HU" sz="1800" dirty="0"/>
+                  <a:t>: a </a:t>
+                </a:r>
+                <a:r>
+                  <a:rPr lang="hu-HU" altLang="hu-HU" sz="1800" dirty="0" err="1"/>
+                  <a:t>sweep</a:t>
+                </a:r>
+                <a:r>
+                  <a:rPr lang="hu-HU" altLang="hu-HU" sz="1800" dirty="0"/>
+                  <a:t> után kapott alakzatot szabályos, </a:t>
+                </a:r>
+                <a:r>
+                  <a:rPr lang="hu-HU" altLang="hu-HU" sz="1800" dirty="0" err="1"/>
+                  <a:t>meta</a:t>
+                </a:r>
+                <a:r>
+                  <a:rPr lang="hu-HU" altLang="hu-HU" sz="1800" dirty="0"/>
+                  <a:t>-modulokra osztott hisztogramba alakítja az algoritmus</a:t>
+                </a:r>
+              </a:p>
+              <a:p>
+                <a:pPr lvl="1" defTabSz="914400" eaLnBrk="0" fontAlgn="base" hangingPunct="0">
+                  <a:lnSpc>
+                    <a:spcPct val="150000"/>
+                  </a:lnSpc>
+                  <a:spcBef>
+                    <a:spcPct val="0"/>
+                  </a:spcBef>
+                  <a:spcAft>
+                    <a:spcPct val="0"/>
+                  </a:spcAft>
+                  <a:buClr>
+                    <a:schemeClr val="accent2">
+                      <a:lumMod val="40000"/>
+                      <a:lumOff val="60000"/>
+                    </a:schemeClr>
+                  </a:buClr>
+                  <a:buSzPct val="90000"/>
+                </a:pPr>
+                <a:r>
+                  <a:rPr lang="hu-HU" altLang="hu-HU" sz="1800" b="1" i="1" dirty="0" err="1"/>
+                  <a:t>Monotonizálás</a:t>
+                </a:r>
+                <a:r>
+                  <a:rPr lang="hu-HU" altLang="hu-HU" sz="1800" b="1" i="1" dirty="0"/>
+                  <a:t>:</a:t>
+                </a:r>
+                <a:r>
+                  <a:rPr lang="hu-HU" altLang="hu-HU" sz="1800" dirty="0"/>
+                  <a:t> ezt xy-monoton hisztogramba transzformálja</a:t>
+                </a:r>
+              </a:p>
+              <a:p>
+                <a:pPr lvl="1" defTabSz="914400" eaLnBrk="0" fontAlgn="base" hangingPunct="0">
+                  <a:lnSpc>
+                    <a:spcPct val="150000"/>
+                  </a:lnSpc>
+                  <a:spcBef>
+                    <a:spcPct val="0"/>
+                  </a:spcBef>
+                  <a:spcAft>
+                    <a:spcPct val="0"/>
+                  </a:spcAft>
+                  <a:buClr>
+                    <a:schemeClr val="accent2">
+                      <a:lumMod val="40000"/>
+                      <a:lumOff val="60000"/>
+                    </a:schemeClr>
+                  </a:buClr>
+                  <a:buSzPct val="90000"/>
+                </a:pPr>
+                <a:r>
+                  <a:rPr lang="hu-HU" altLang="hu-HU" sz="1800" b="1" i="1" dirty="0"/>
+                  <a:t>Átkötés</a:t>
+                </a:r>
+                <a:r>
+                  <a:rPr lang="hu-HU" altLang="hu-HU" sz="1800" dirty="0"/>
+                  <a:t>: mivel bármelyik két xy-monoton hisztogram könnyen egymásba alakítható, így ez adja az általános átalakítási stratégiát</a:t>
+                </a:r>
+              </a:p>
+              <a:p>
+                <a:r>
+                  <a:rPr lang="hu-HU" dirty="0"/>
+                  <a:t>Tehát: minden bonyolult alakzatot átalakít egy sztenderd hisztogramba, majd ebből tetszőleges másik hisztogramon keresztül bármilyen célalakzatot elő tud állítani</a:t>
+                </a:r>
+              </a:p>
+            </p:txBody>
+          </p:sp>
+        </mc:Choice>
+        <mc:Fallback>
+          <p:sp>
+            <p:nvSpPr>
+              <p:cNvPr id="3" name="Tartalom helye 2">
+                <a:extLst>
+                  <a:ext uri="{FF2B5EF4-FFF2-40B4-BE49-F238E27FC236}">
+                    <a16:creationId xmlns:a16="http://schemas.microsoft.com/office/drawing/2014/main" id="{514A56C7-0C0C-EE97-D6DF-824095D16113}"/>
+                  </a:ext>
+                </a:extLst>
+              </p:cNvPr>
+              <p:cNvSpPr>
+                <a:spLocks noGrp="1" noRot="1" noChangeAspect="1" noMove="1" noResize="1" noEditPoints="1" noAdjustHandles="1" noChangeArrowheads="1" noChangeShapeType="1" noTextEdit="1"/>
+              </p:cNvSpPr>
+              <p:nvPr>
+                <p:ph idx="1"/>
+              </p:nvPr>
+            </p:nvSpPr>
+            <p:spPr>
+              <a:xfrm>
+                <a:off x="1219200" y="2364014"/>
+                <a:ext cx="8825659" cy="4178300"/>
+              </a:xfrm>
+              <a:blipFill>
+                <a:blip r:embed="rId2"/>
+                <a:stretch>
+                  <a:fillRect l="-138" t="-876"/>
+                </a:stretch>
+              </a:blipFill>
+            </p:spPr>
+            <p:txBody>
+              <a:bodyPr/>
+              <a:lstStyle/>
+              <a:p>
+                <a:r>
+                  <a:rPr lang="hu-HU">
+                    <a:noFill/>
+                  </a:rPr>
+                  <a:t> </a:t>
+                </a:r>
+              </a:p>
+            </p:txBody>
+          </p:sp>
+        </mc:Fallback>
+      </mc:AlternateContent>
+    </p:spTree>
+    <p:extLst>
+      <p:ext uri="{BB962C8B-B14F-4D97-AF65-F5344CB8AC3E}">
+        <p14:creationId xmlns:p14="http://schemas.microsoft.com/office/powerpoint/2010/main" val="973868793"/>
+      </p:ext>
+    </p:extLst>
+  </p:cSld>
+  <p:clrMapOvr>
+    <a:masterClrMapping/>
+  </p:clrMapOvr>
+</p:sld>
+</file>
+
+<file path=ppt/slides/slide27.xml><?xml version="1.0" encoding="utf-8"?>
+<p:sld xmlns:a="http://schemas.openxmlformats.org/drawingml/2006/main" xmlns:r="http://schemas.openxmlformats.org/officeDocument/2006/relationships" xmlns:p="http://schemas.openxmlformats.org/presentationml/2006/main">
+  <p:cSld>
+    <p:spTree>
+      <p:nvGrpSpPr>
+        <p:cNvPr id="1" name=""/>
+        <p:cNvGrpSpPr/>
+        <p:nvPr/>
+      </p:nvGrpSpPr>
+      <p:grpSpPr>
+        <a:xfrm>
+          <a:off x="0" y="0"/>
+          <a:ext cx="0" cy="0"/>
+          <a:chOff x="0" y="0"/>
+          <a:chExt cx="0" cy="0"/>
+        </a:xfrm>
+      </p:grpSpPr>
+      <p:sp>
+        <p:nvSpPr>
+          <p:cNvPr id="2" name="Cím 1">
+            <a:extLst>
+              <a:ext uri="{FF2B5EF4-FFF2-40B4-BE49-F238E27FC236}">
+                <a16:creationId xmlns:a16="http://schemas.microsoft.com/office/drawing/2014/main" id="{BCE40F28-636C-B6E1-475E-DBE00C99659D}"/>
+              </a:ext>
+            </a:extLst>
+          </p:cNvPr>
+          <p:cNvSpPr>
+            <a:spLocks noGrp="1"/>
+          </p:cNvSpPr>
+          <p:nvPr>
+            <p:ph type="title"/>
+          </p:nvPr>
+        </p:nvSpPr>
+        <p:spPr>
+          <a:xfrm>
+            <a:off x="1154954" y="712411"/>
+            <a:ext cx="8761413" cy="1247018"/>
+          </a:xfrm>
+        </p:spPr>
+        <p:txBody>
+          <a:bodyPr/>
+          <a:lstStyle/>
+          <a:p>
+            <a:r>
+              <a:rPr lang="hu-HU" dirty="0"/>
+              <a:t>Következtetés és továbbfejlesztési lehetőségek</a:t>
+            </a:r>
+          </a:p>
+        </p:txBody>
+      </p:sp>
+      <p:sp>
+        <p:nvSpPr>
+          <p:cNvPr id="3" name="Tartalom helye 2">
+            <a:extLst>
+              <a:ext uri="{FF2B5EF4-FFF2-40B4-BE49-F238E27FC236}">
+                <a16:creationId xmlns:a16="http://schemas.microsoft.com/office/drawing/2014/main" id="{26808292-257D-94AC-F73C-79DC639D7FE4}"/>
+              </a:ext>
+            </a:extLst>
+          </p:cNvPr>
+          <p:cNvSpPr>
+            <a:spLocks noGrp="1"/>
+          </p:cNvSpPr>
+          <p:nvPr>
+            <p:ph idx="1"/>
+          </p:nvPr>
+        </p:nvSpPr>
+        <p:spPr>
+          <a:xfrm>
+            <a:off x="1307354" y="2471057"/>
+            <a:ext cx="8825659" cy="4103913"/>
+          </a:xfrm>
+        </p:spPr>
+        <p:txBody>
+          <a:bodyPr>
+            <a:normAutofit/>
+          </a:bodyPr>
+          <a:lstStyle/>
+          <a:p>
+            <a:r>
+              <a:rPr lang="hu-HU" b="1" dirty="0"/>
+              <a:t>Eredmények</a:t>
+            </a:r>
+            <a:r>
+              <a:rPr lang="hu-HU" dirty="0"/>
+              <a:t>:</a:t>
+            </a:r>
+          </a:p>
+          <a:p>
+            <a:pPr lvl="1"/>
+            <a:r>
+              <a:rPr lang="hu-HU" sz="1800" dirty="0" err="1"/>
+              <a:t>Worst-case</a:t>
+            </a:r>
+            <a:r>
+              <a:rPr lang="hu-HU" sz="1800" dirty="0"/>
+              <a:t> optimális algoritmus</a:t>
+            </a:r>
+          </a:p>
+          <a:p>
+            <a:pPr lvl="1"/>
+            <a:r>
+              <a:rPr lang="hu-HU" sz="1800" dirty="0"/>
+              <a:t>Új eredmények a </a:t>
+            </a:r>
+            <a:r>
+              <a:rPr lang="hu-HU" sz="1800" i="1" dirty="0" err="1"/>
+              <a:t>sliding</a:t>
+            </a:r>
+            <a:r>
+              <a:rPr lang="hu-HU" sz="1800" dirty="0"/>
+              <a:t> </a:t>
+            </a:r>
+            <a:r>
+              <a:rPr lang="hu-HU" sz="1800" i="1" dirty="0" err="1"/>
+              <a:t>squares</a:t>
+            </a:r>
+            <a:r>
+              <a:rPr lang="hu-HU" sz="1800" dirty="0"/>
+              <a:t> modellhez, kihasználva a párhuzamos robotmozgást</a:t>
+            </a:r>
+          </a:p>
+          <a:p>
+            <a:pPr lvl="1"/>
+            <a:r>
+              <a:rPr lang="hu-HU" sz="1800" dirty="0"/>
+              <a:t>Bizonyítva: Az elért felsőkorátok </a:t>
+            </a:r>
+            <a:r>
+              <a:rPr lang="hu-HU" sz="1800" dirty="0" err="1"/>
+              <a:t>asszimptotikusan</a:t>
+            </a:r>
+            <a:r>
+              <a:rPr lang="hu-HU" sz="1800" dirty="0"/>
+              <a:t> nem javíthatók</a:t>
+            </a:r>
+          </a:p>
+          <a:p>
+            <a:r>
+              <a:rPr lang="hu-HU" b="1" dirty="0"/>
+              <a:t>Kutatási lehetőség</a:t>
+            </a:r>
+            <a:r>
+              <a:rPr lang="hu-HU" dirty="0"/>
+              <a:t>: </a:t>
+            </a:r>
+          </a:p>
+          <a:p>
+            <a:pPr lvl="1"/>
+            <a:r>
+              <a:rPr lang="hu-HU" sz="1800" dirty="0"/>
+              <a:t>3D térben alkalmazni az algoritmust</a:t>
+            </a:r>
+          </a:p>
+          <a:p>
+            <a:pPr lvl="1"/>
+            <a:r>
+              <a:rPr lang="hu-HU" sz="1800" dirty="0"/>
+              <a:t>Hatékony döntés: létezik-e 1-makespan ütemezés?</a:t>
+            </a:r>
+          </a:p>
+          <a:p>
+            <a:pPr lvl="2"/>
+            <a:r>
+              <a:rPr lang="hu-HU" sz="1600" dirty="0"/>
+              <a:t>Modulok „</a:t>
+            </a:r>
+            <a:r>
+              <a:rPr lang="hu-HU" sz="1600" dirty="0" err="1"/>
+              <a:t>sorbarendezése</a:t>
+            </a:r>
+            <a:r>
+              <a:rPr lang="hu-HU" sz="1600" dirty="0"/>
+              <a:t>” xy-</a:t>
+            </a:r>
+            <a:r>
+              <a:rPr lang="hu-HU" sz="1600" dirty="0" err="1"/>
+              <a:t>monotone</a:t>
+            </a:r>
+            <a:r>
+              <a:rPr lang="hu-HU" sz="1600" dirty="0"/>
+              <a:t> konfigurációban O(P) lépés alatt</a:t>
+            </a:r>
+          </a:p>
+          <a:p>
+            <a:pPr lvl="1"/>
+            <a:r>
+              <a:rPr lang="hu-HU" sz="1800" dirty="0"/>
+              <a:t>Ütemezés megtalálása O(d) </a:t>
+            </a:r>
+            <a:r>
+              <a:rPr lang="hu-HU" sz="1800" dirty="0" err="1"/>
+              <a:t>makespannel</a:t>
+            </a:r>
+            <a:r>
+              <a:rPr lang="hu-HU" sz="1800" dirty="0"/>
+              <a:t>, ahol </a:t>
+            </a:r>
+            <a:r>
+              <a:rPr lang="hu-HU" sz="1800" i="1" dirty="0"/>
+              <a:t>d</a:t>
+            </a:r>
+            <a:r>
+              <a:rPr lang="hu-HU" sz="1800" dirty="0"/>
+              <a:t> a </a:t>
+            </a:r>
+            <a:r>
+              <a:rPr lang="hu-HU" sz="1800" dirty="0" err="1"/>
+              <a:t>max</a:t>
+            </a:r>
+            <a:r>
+              <a:rPr lang="hu-HU" sz="1800" dirty="0"/>
+              <a:t>. távolság</a:t>
+            </a:r>
+          </a:p>
+          <a:p>
+            <a:endParaRPr lang="hu-HU" dirty="0"/>
+          </a:p>
+        </p:txBody>
+      </p:sp>
+    </p:spTree>
+    <p:extLst>
+      <p:ext uri="{BB962C8B-B14F-4D97-AF65-F5344CB8AC3E}">
+        <p14:creationId xmlns:p14="http://schemas.microsoft.com/office/powerpoint/2010/main" val="4280881742"/>
       </p:ext>
     </p:extLst>
   </p:cSld>
@@ -18664,4 +20623,319 @@
     </a:ext>
   </a:extLst>
 </a:theme>
+</file>
+
+<file path=ppt/theme/theme2.xml><?xml version="1.0" encoding="utf-8"?>
+<a:theme xmlns:a="http://schemas.openxmlformats.org/drawingml/2006/main" name="Office-téma">
+  <a:themeElements>
+    <a:clrScheme name="Office">
+      <a:dk1>
+        <a:sysClr val="windowText" lastClr="000000"/>
+      </a:dk1>
+      <a:lt1>
+        <a:sysClr val="window" lastClr="FFFFFF"/>
+      </a:lt1>
+      <a:dk2>
+        <a:srgbClr val="0E2841"/>
+      </a:dk2>
+      <a:lt2>
+        <a:srgbClr val="E8E8E8"/>
+      </a:lt2>
+      <a:accent1>
+        <a:srgbClr val="156082"/>
+      </a:accent1>
+      <a:accent2>
+        <a:srgbClr val="E97132"/>
+      </a:accent2>
+      <a:accent3>
+        <a:srgbClr val="196B24"/>
+      </a:accent3>
+      <a:accent4>
+        <a:srgbClr val="0F9ED5"/>
+      </a:accent4>
+      <a:accent5>
+        <a:srgbClr val="A02B93"/>
+      </a:accent5>
+      <a:accent6>
+        <a:srgbClr val="4EA72E"/>
+      </a:accent6>
+      <a:hlink>
+        <a:srgbClr val="467886"/>
+      </a:hlink>
+      <a:folHlink>
+        <a:srgbClr val="96607D"/>
+      </a:folHlink>
+    </a:clrScheme>
+    <a:fontScheme name="Office">
+      <a:majorFont>
+        <a:latin typeface="Aptos Display" panose="02110004020202020204"/>
+        <a:ea typeface=""/>
+        <a:cs typeface=""/>
+        <a:font script="Jpan" typeface="游ゴシック Light"/>
+        <a:font script="Hang" typeface="맑은 고딕"/>
+        <a:font script="Hans" typeface="等线 Light"/>
+        <a:font script="Hant" typeface="新細明體"/>
+        <a:font script="Arab" typeface="Times New Roman"/>
+        <a:font script="Hebr" typeface="Times New Roman"/>
+        <a:font script="Thai" typeface="Angsana New"/>
+        <a:font script="Ethi" typeface="Nyala"/>
+        <a:font script="Beng" typeface="Vrinda"/>
+        <a:font script="Gujr" typeface="Shruti"/>
+        <a:font script="Khmr" typeface="MoolBoran"/>
+        <a:font script="Knda" typeface="Tunga"/>
+        <a:font script="Guru" typeface="Raavi"/>
+        <a:font script="Cans" typeface="Euphemia"/>
+        <a:font script="Cher" typeface="Plantagenet Cherokee"/>
+        <a:font script="Yiii" typeface="Microsoft Yi Baiti"/>
+        <a:font script="Tibt" typeface="Microsoft Himalaya"/>
+        <a:font script="Thaa" typeface="MV Boli"/>
+        <a:font script="Deva" typeface="Mangal"/>
+        <a:font script="Telu" typeface="Gautami"/>
+        <a:font script="Taml" typeface="Latha"/>
+        <a:font script="Syrc" typeface="Estrangelo Edessa"/>
+        <a:font script="Orya" typeface="Kalinga"/>
+        <a:font script="Mlym" typeface="Kartika"/>
+        <a:font script="Laoo" typeface="DokChampa"/>
+        <a:font script="Sinh" typeface="Iskoola Pota"/>
+        <a:font script="Mong" typeface="Mongolian Baiti"/>
+        <a:font script="Viet" typeface="Times New Roman"/>
+        <a:font script="Uigh" typeface="Microsoft Uighur"/>
+        <a:font script="Geor" typeface="Sylfaen"/>
+        <a:font script="Armn" typeface="Arial"/>
+        <a:font script="Bugi" typeface="Leelawadee UI"/>
+        <a:font script="Bopo" typeface="Microsoft JhengHei"/>
+        <a:font script="Java" typeface="Javanese Text"/>
+        <a:font script="Lisu" typeface="Segoe UI"/>
+        <a:font script="Mymr" typeface="Myanmar Text"/>
+        <a:font script="Nkoo" typeface="Ebrima"/>
+        <a:font script="Olck" typeface="Nirmala UI"/>
+        <a:font script="Osma" typeface="Ebrima"/>
+        <a:font script="Phag" typeface="Phagspa"/>
+        <a:font script="Syrn" typeface="Estrangelo Edessa"/>
+        <a:font script="Syrj" typeface="Estrangelo Edessa"/>
+        <a:font script="Syre" typeface="Estrangelo Edessa"/>
+        <a:font script="Sora" typeface="Nirmala UI"/>
+        <a:font script="Tale" typeface="Microsoft Tai Le"/>
+        <a:font script="Talu" typeface="Microsoft New Tai Lue"/>
+        <a:font script="Tfng" typeface="Ebrima"/>
+      </a:majorFont>
+      <a:minorFont>
+        <a:latin typeface="Aptos" panose="02110004020202020204"/>
+        <a:ea typeface=""/>
+        <a:cs typeface=""/>
+        <a:font script="Jpan" typeface="游ゴシック"/>
+        <a:font script="Hang" typeface="맑은 고딕"/>
+        <a:font script="Hans" typeface="等线"/>
+        <a:font script="Hant" typeface="新細明體"/>
+        <a:font script="Arab" typeface="Arial"/>
+        <a:font script="Hebr" typeface="Arial"/>
+        <a:font script="Thai" typeface="Cordia New"/>
+        <a:font script="Ethi" typeface="Nyala"/>
+        <a:font script="Beng" typeface="Vrinda"/>
+        <a:font script="Gujr" typeface="Shruti"/>
+        <a:font script="Khmr" typeface="DaunPenh"/>
+        <a:font script="Knda" typeface="Tunga"/>
+        <a:font script="Guru" typeface="Raavi"/>
+        <a:font script="Cans" typeface="Euphemia"/>
+        <a:font script="Cher" typeface="Plantagenet Cherokee"/>
+        <a:font script="Yiii" typeface="Microsoft Yi Baiti"/>
+        <a:font script="Tibt" typeface="Microsoft Himalaya"/>
+        <a:font script="Thaa" typeface="MV Boli"/>
+        <a:font script="Deva" typeface="Mangal"/>
+        <a:font script="Telu" typeface="Gautami"/>
+        <a:font script="Taml" typeface="Latha"/>
+        <a:font script="Syrc" typeface="Estrangelo Edessa"/>
+        <a:font script="Orya" typeface="Kalinga"/>
+        <a:font script="Mlym" typeface="Kartika"/>
+        <a:font script="Laoo" typeface="DokChampa"/>
+        <a:font script="Sinh" typeface="Iskoola Pota"/>
+        <a:font script="Mong" typeface="Mongolian Baiti"/>
+        <a:font script="Viet" typeface="Arial"/>
+        <a:font script="Uigh" typeface="Microsoft Uighur"/>
+        <a:font script="Geor" typeface="Sylfaen"/>
+        <a:font script="Armn" typeface="Arial"/>
+        <a:font script="Bugi" typeface="Leelawadee UI"/>
+        <a:font script="Bopo" typeface="Microsoft JhengHei"/>
+        <a:font script="Java" typeface="Javanese Text"/>
+        <a:font script="Lisu" typeface="Segoe UI"/>
+        <a:font script="Mymr" typeface="Myanmar Text"/>
+        <a:font script="Nkoo" typeface="Ebrima"/>
+        <a:font script="Olck" typeface="Nirmala UI"/>
+        <a:font script="Osma" typeface="Ebrima"/>
+        <a:font script="Phag" typeface="Phagspa"/>
+        <a:font script="Syrn" typeface="Estrangelo Edessa"/>
+        <a:font script="Syrj" typeface="Estrangelo Edessa"/>
+        <a:font script="Syre" typeface="Estrangelo Edessa"/>
+        <a:font script="Sora" typeface="Nirmala UI"/>
+        <a:font script="Tale" typeface="Microsoft Tai Le"/>
+        <a:font script="Talu" typeface="Microsoft New Tai Lue"/>
+        <a:font script="Tfng" typeface="Ebrima"/>
+      </a:minorFont>
+    </a:fontScheme>
+    <a:fmtScheme name="Office">
+      <a:fillStyleLst>
+        <a:solidFill>
+          <a:schemeClr val="phClr"/>
+        </a:solidFill>
+        <a:gradFill rotWithShape="1">
+          <a:gsLst>
+            <a:gs pos="0">
+              <a:schemeClr val="phClr">
+                <a:lumMod val="110000"/>
+                <a:satMod val="105000"/>
+                <a:tint val="67000"/>
+              </a:schemeClr>
+            </a:gs>
+            <a:gs pos="50000">
+              <a:schemeClr val="phClr">
+                <a:lumMod val="105000"/>
+                <a:satMod val="103000"/>
+                <a:tint val="73000"/>
+              </a:schemeClr>
+            </a:gs>
+            <a:gs pos="100000">
+              <a:schemeClr val="phClr">
+                <a:lumMod val="105000"/>
+                <a:satMod val="109000"/>
+                <a:tint val="81000"/>
+              </a:schemeClr>
+            </a:gs>
+          </a:gsLst>
+          <a:lin ang="5400000" scaled="0"/>
+        </a:gradFill>
+        <a:gradFill rotWithShape="1">
+          <a:gsLst>
+            <a:gs pos="0">
+              <a:schemeClr val="phClr">
+                <a:satMod val="103000"/>
+                <a:lumMod val="102000"/>
+                <a:tint val="94000"/>
+              </a:schemeClr>
+            </a:gs>
+            <a:gs pos="50000">
+              <a:schemeClr val="phClr">
+                <a:satMod val="110000"/>
+                <a:lumMod val="100000"/>
+                <a:shade val="100000"/>
+              </a:schemeClr>
+            </a:gs>
+            <a:gs pos="100000">
+              <a:schemeClr val="phClr">
+                <a:lumMod val="99000"/>
+                <a:satMod val="120000"/>
+                <a:shade val="78000"/>
+              </a:schemeClr>
+            </a:gs>
+          </a:gsLst>
+          <a:lin ang="5400000" scaled="0"/>
+        </a:gradFill>
+      </a:fillStyleLst>
+      <a:lnStyleLst>
+        <a:ln w="12700" cap="flat" cmpd="sng" algn="ctr">
+          <a:solidFill>
+            <a:schemeClr val="phClr"/>
+          </a:solidFill>
+          <a:prstDash val="solid"/>
+          <a:miter lim="800000"/>
+        </a:ln>
+        <a:ln w="19050" cap="flat" cmpd="sng" algn="ctr">
+          <a:solidFill>
+            <a:schemeClr val="phClr"/>
+          </a:solidFill>
+          <a:prstDash val="solid"/>
+          <a:miter lim="800000"/>
+        </a:ln>
+        <a:ln w="25400" cap="flat" cmpd="sng" algn="ctr">
+          <a:solidFill>
+            <a:schemeClr val="phClr"/>
+          </a:solidFill>
+          <a:prstDash val="solid"/>
+          <a:miter lim="800000"/>
+        </a:ln>
+      </a:lnStyleLst>
+      <a:effectStyleLst>
+        <a:effectStyle>
+          <a:effectLst/>
+        </a:effectStyle>
+        <a:effectStyle>
+          <a:effectLst/>
+        </a:effectStyle>
+        <a:effectStyle>
+          <a:effectLst>
+            <a:outerShdw blurRad="57150" dist="19050" dir="5400000" algn="ctr" rotWithShape="0">
+              <a:srgbClr val="000000">
+                <a:alpha val="63000"/>
+              </a:srgbClr>
+            </a:outerShdw>
+          </a:effectLst>
+        </a:effectStyle>
+      </a:effectStyleLst>
+      <a:bgFillStyleLst>
+        <a:solidFill>
+          <a:schemeClr val="phClr"/>
+        </a:solidFill>
+        <a:solidFill>
+          <a:schemeClr val="phClr">
+            <a:tint val="95000"/>
+            <a:satMod val="170000"/>
+          </a:schemeClr>
+        </a:solidFill>
+        <a:gradFill rotWithShape="1">
+          <a:gsLst>
+            <a:gs pos="0">
+              <a:schemeClr val="phClr">
+                <a:tint val="93000"/>
+                <a:satMod val="150000"/>
+                <a:shade val="98000"/>
+                <a:lumMod val="102000"/>
+              </a:schemeClr>
+            </a:gs>
+            <a:gs pos="50000">
+              <a:schemeClr val="phClr">
+                <a:tint val="98000"/>
+                <a:satMod val="130000"/>
+                <a:shade val="90000"/>
+                <a:lumMod val="103000"/>
+              </a:schemeClr>
+            </a:gs>
+            <a:gs pos="100000">
+              <a:schemeClr val="phClr">
+                <a:shade val="63000"/>
+                <a:satMod val="120000"/>
+              </a:schemeClr>
+            </a:gs>
+          </a:gsLst>
+          <a:lin ang="5400000" scaled="0"/>
+        </a:gradFill>
+      </a:bgFillStyleLst>
+    </a:fmtScheme>
+  </a:themeElements>
+  <a:objectDefaults>
+    <a:lnDef>
+      <a:spPr/>
+      <a:bodyPr/>
+      <a:lstStyle/>
+      <a:style>
+        <a:lnRef idx="2">
+          <a:schemeClr val="accent1"/>
+        </a:lnRef>
+        <a:fillRef idx="0">
+          <a:schemeClr val="accent1"/>
+        </a:fillRef>
+        <a:effectRef idx="1">
+          <a:schemeClr val="accent1"/>
+        </a:effectRef>
+        <a:fontRef idx="minor">
+          <a:schemeClr val="tx1"/>
+        </a:fontRef>
+      </a:style>
+    </a:lnDef>
+  </a:objectDefaults>
+  <a:extraClrSchemeLst/>
+  <a:extLst>
+    <a:ext uri="{05A4C25C-085E-4340-85A3-A5531E510DB2}">
+      <thm15:themeFamily xmlns:thm15="http://schemas.microsoft.com/office/thememl/2012/main" name="Office Theme" id="{2E142A2C-CD16-42D6-873A-C26D2A0506FA}" vid="{1BDDFF52-6CD6-40A5-AB3C-68EB2F1E4D0A}"/>
+    </a:ext>
+  </a:extLst>
+</a:theme>
 </file>
</xml_diff>